<commit_message>
Atualização do documento + Product Backlog adicionado a pasta
</commit_message>
<xml_diff>
--- a/Gabriela/Documentação/Diagramas e requisitos.pptx
+++ b/Gabriela/Documentação/Diagramas e requisitos.pptx
@@ -262,7 +262,7 @@
           <a:p>
             <a:fld id="{B2AC86AB-0CDC-4237-BD09-4986E74D54A4}" type="datetimeFigureOut">
               <a:rPr lang="pt-BR" smtClean="0"/>
-              <a:t>20/08/2022</a:t>
+              <a:t>04/09/2022</a:t>
             </a:fld>
             <a:endParaRPr lang="pt-BR"/>
           </a:p>
@@ -460,7 +460,7 @@
           <a:p>
             <a:fld id="{B2AC86AB-0CDC-4237-BD09-4986E74D54A4}" type="datetimeFigureOut">
               <a:rPr lang="pt-BR" smtClean="0"/>
-              <a:t>20/08/2022</a:t>
+              <a:t>04/09/2022</a:t>
             </a:fld>
             <a:endParaRPr lang="pt-BR"/>
           </a:p>
@@ -668,7 +668,7 @@
           <a:p>
             <a:fld id="{B2AC86AB-0CDC-4237-BD09-4986E74D54A4}" type="datetimeFigureOut">
               <a:rPr lang="pt-BR" smtClean="0"/>
-              <a:t>20/08/2022</a:t>
+              <a:t>04/09/2022</a:t>
             </a:fld>
             <a:endParaRPr lang="pt-BR"/>
           </a:p>
@@ -866,7 +866,7 @@
           <a:p>
             <a:fld id="{B2AC86AB-0CDC-4237-BD09-4986E74D54A4}" type="datetimeFigureOut">
               <a:rPr lang="pt-BR" smtClean="0"/>
-              <a:t>20/08/2022</a:t>
+              <a:t>04/09/2022</a:t>
             </a:fld>
             <a:endParaRPr lang="pt-BR"/>
           </a:p>
@@ -1141,7 +1141,7 @@
           <a:p>
             <a:fld id="{B2AC86AB-0CDC-4237-BD09-4986E74D54A4}" type="datetimeFigureOut">
               <a:rPr lang="pt-BR" smtClean="0"/>
-              <a:t>20/08/2022</a:t>
+              <a:t>04/09/2022</a:t>
             </a:fld>
             <a:endParaRPr lang="pt-BR"/>
           </a:p>
@@ -1406,7 +1406,7 @@
           <a:p>
             <a:fld id="{B2AC86AB-0CDC-4237-BD09-4986E74D54A4}" type="datetimeFigureOut">
               <a:rPr lang="pt-BR" smtClean="0"/>
-              <a:t>20/08/2022</a:t>
+              <a:t>04/09/2022</a:t>
             </a:fld>
             <a:endParaRPr lang="pt-BR"/>
           </a:p>
@@ -1818,7 +1818,7 @@
           <a:p>
             <a:fld id="{B2AC86AB-0CDC-4237-BD09-4986E74D54A4}" type="datetimeFigureOut">
               <a:rPr lang="pt-BR" smtClean="0"/>
-              <a:t>20/08/2022</a:t>
+              <a:t>04/09/2022</a:t>
             </a:fld>
             <a:endParaRPr lang="pt-BR"/>
           </a:p>
@@ -1959,7 +1959,7 @@
           <a:p>
             <a:fld id="{B2AC86AB-0CDC-4237-BD09-4986E74D54A4}" type="datetimeFigureOut">
               <a:rPr lang="pt-BR" smtClean="0"/>
-              <a:t>20/08/2022</a:t>
+              <a:t>04/09/2022</a:t>
             </a:fld>
             <a:endParaRPr lang="pt-BR"/>
           </a:p>
@@ -2072,7 +2072,7 @@
           <a:p>
             <a:fld id="{B2AC86AB-0CDC-4237-BD09-4986E74D54A4}" type="datetimeFigureOut">
               <a:rPr lang="pt-BR" smtClean="0"/>
-              <a:t>20/08/2022</a:t>
+              <a:t>04/09/2022</a:t>
             </a:fld>
             <a:endParaRPr lang="pt-BR"/>
           </a:p>
@@ -2383,7 +2383,7 @@
           <a:p>
             <a:fld id="{B2AC86AB-0CDC-4237-BD09-4986E74D54A4}" type="datetimeFigureOut">
               <a:rPr lang="pt-BR" smtClean="0"/>
-              <a:t>20/08/2022</a:t>
+              <a:t>04/09/2022</a:t>
             </a:fld>
             <a:endParaRPr lang="pt-BR"/>
           </a:p>
@@ -2671,7 +2671,7 @@
           <a:p>
             <a:fld id="{B2AC86AB-0CDC-4237-BD09-4986E74D54A4}" type="datetimeFigureOut">
               <a:rPr lang="pt-BR" smtClean="0"/>
-              <a:t>20/08/2022</a:t>
+              <a:t>04/09/2022</a:t>
             </a:fld>
             <a:endParaRPr lang="pt-BR"/>
           </a:p>
@@ -2912,7 +2912,7 @@
           <a:p>
             <a:fld id="{B2AC86AB-0CDC-4237-BD09-4986E74D54A4}" type="datetimeFigureOut">
               <a:rPr lang="pt-BR" smtClean="0"/>
-              <a:t>20/08/2022</a:t>
+              <a:t>04/09/2022</a:t>
             </a:fld>
             <a:endParaRPr lang="pt-BR"/>
           </a:p>
@@ -3562,10 +3562,10 @@
       </p:grpSpPr>
       <p:sp>
         <p:nvSpPr>
-          <p:cNvPr id="2" name="Retângulo 1">
-            <a:extLst>
-              <a:ext uri="{FF2B5EF4-FFF2-40B4-BE49-F238E27FC236}">
-                <a16:creationId xmlns:a16="http://schemas.microsoft.com/office/drawing/2014/main" id="{5788135A-F865-8B1D-4E7F-1ECACF0E80EF}"/>
+          <p:cNvPr id="38" name="Retângulo 37">
+            <a:extLst>
+              <a:ext uri="{FF2B5EF4-FFF2-40B4-BE49-F238E27FC236}">
+                <a16:creationId xmlns:a16="http://schemas.microsoft.com/office/drawing/2014/main" id="{67019172-36F0-BFF3-4A57-D138E795A09C}"/>
               </a:ext>
             </a:extLst>
           </p:cNvPr>
@@ -3574,7 +3574,59 @@
         </p:nvSpPr>
         <p:spPr>
           <a:xfrm>
-            <a:off x="0" y="0"/>
+            <a:off x="12151" y="1673"/>
+            <a:ext cx="12192000" cy="6858000"/>
+          </a:xfrm>
+          <a:prstGeom prst="rect">
+            <a:avLst/>
+          </a:prstGeom>
+          <a:solidFill>
+            <a:srgbClr val="D9EFFF"/>
+          </a:solidFill>
+          <a:ln>
+            <a:noFill/>
+          </a:ln>
+        </p:spPr>
+        <p:style>
+          <a:lnRef idx="2">
+            <a:schemeClr val="accent1">
+              <a:shade val="50000"/>
+            </a:schemeClr>
+          </a:lnRef>
+          <a:fillRef idx="1">
+            <a:schemeClr val="accent1"/>
+          </a:fillRef>
+          <a:effectRef idx="0">
+            <a:schemeClr val="accent1"/>
+          </a:effectRef>
+          <a:fontRef idx="minor">
+            <a:schemeClr val="lt1"/>
+          </a:fontRef>
+        </p:style>
+        <p:txBody>
+          <a:bodyPr rtlCol="0" anchor="ctr"/>
+          <a:lstStyle/>
+          <a:p>
+            <a:pPr algn="ctr"/>
+            <a:endParaRPr lang="pt-BR"/>
+          </a:p>
+        </p:txBody>
+      </p:sp>
+      <p:sp>
+        <p:nvSpPr>
+          <p:cNvPr id="2" name="Retângulo 1">
+            <a:extLst>
+              <a:ext uri="{FF2B5EF4-FFF2-40B4-BE49-F238E27FC236}">
+                <a16:creationId xmlns:a16="http://schemas.microsoft.com/office/drawing/2014/main" id="{5788135A-F865-8B1D-4E7F-1ECACF0E80EF}"/>
+              </a:ext>
+            </a:extLst>
+          </p:cNvPr>
+          <p:cNvSpPr/>
+          <p:nvPr/>
+        </p:nvSpPr>
+        <p:spPr>
+          <a:xfrm>
+            <a:off x="8878" y="0"/>
             <a:ext cx="12192000" cy="6858000"/>
           </a:xfrm>
           <a:prstGeom prst="rect">
@@ -3617,6 +3669,58 @@
       </p:sp>
       <p:sp>
         <p:nvSpPr>
+          <p:cNvPr id="47" name="Elipse 46">
+            <a:extLst>
+              <a:ext uri="{FF2B5EF4-FFF2-40B4-BE49-F238E27FC236}">
+                <a16:creationId xmlns:a16="http://schemas.microsoft.com/office/drawing/2014/main" id="{9C1901CC-386E-D0C9-056D-7CD27DBAD303}"/>
+              </a:ext>
+            </a:extLst>
+          </p:cNvPr>
+          <p:cNvSpPr/>
+          <p:nvPr/>
+        </p:nvSpPr>
+        <p:spPr>
+          <a:xfrm>
+            <a:off x="9059092" y="1210775"/>
+            <a:ext cx="2480160" cy="2453216"/>
+          </a:xfrm>
+          <a:prstGeom prst="ellipse">
+            <a:avLst/>
+          </a:prstGeom>
+          <a:solidFill>
+            <a:schemeClr val="bg1"/>
+          </a:solidFill>
+          <a:ln>
+            <a:noFill/>
+          </a:ln>
+        </p:spPr>
+        <p:style>
+          <a:lnRef idx="2">
+            <a:schemeClr val="accent1">
+              <a:shade val="50000"/>
+            </a:schemeClr>
+          </a:lnRef>
+          <a:fillRef idx="1">
+            <a:schemeClr val="accent1"/>
+          </a:fillRef>
+          <a:effectRef idx="0">
+            <a:schemeClr val="accent1"/>
+          </a:effectRef>
+          <a:fontRef idx="minor">
+            <a:schemeClr val="lt1"/>
+          </a:fontRef>
+        </p:style>
+        <p:txBody>
+          <a:bodyPr rtlCol="0" anchor="ctr"/>
+          <a:lstStyle/>
+          <a:p>
+            <a:pPr algn="ctr"/>
+            <a:endParaRPr lang="pt-BR"/>
+          </a:p>
+        </p:txBody>
+      </p:sp>
+      <p:sp>
+        <p:nvSpPr>
           <p:cNvPr id="3" name="CaixaDeTexto 2">
             <a:extLst>
               <a:ext uri="{FF2B5EF4-FFF2-40B4-BE49-F238E27FC236}">
@@ -3629,7 +3733,7 @@
         </p:nvSpPr>
         <p:spPr>
           <a:xfrm>
-            <a:off x="2325946" y="150856"/>
+            <a:off x="2326959" y="151646"/>
             <a:ext cx="7688062" cy="707886"/>
           </a:xfrm>
           <a:prstGeom prst="rect">
@@ -3663,12 +3767,64 @@
           </a:p>
         </p:txBody>
       </p:sp>
+      <p:sp>
+        <p:nvSpPr>
+          <p:cNvPr id="39" name="Elipse 38">
+            <a:extLst>
+              <a:ext uri="{FF2B5EF4-FFF2-40B4-BE49-F238E27FC236}">
+                <a16:creationId xmlns:a16="http://schemas.microsoft.com/office/drawing/2014/main" id="{36A0B3F5-DCD1-672F-4743-5EFFC09A9744}"/>
+              </a:ext>
+            </a:extLst>
+          </p:cNvPr>
+          <p:cNvSpPr/>
+          <p:nvPr/>
+        </p:nvSpPr>
+        <p:spPr>
+          <a:xfrm>
+            <a:off x="492502" y="1462047"/>
+            <a:ext cx="2480160" cy="2453216"/>
+          </a:xfrm>
+          <a:prstGeom prst="ellipse">
+            <a:avLst/>
+          </a:prstGeom>
+          <a:solidFill>
+            <a:schemeClr val="bg1"/>
+          </a:solidFill>
+          <a:ln>
+            <a:noFill/>
+          </a:ln>
+        </p:spPr>
+        <p:style>
+          <a:lnRef idx="2">
+            <a:schemeClr val="accent1">
+              <a:shade val="50000"/>
+            </a:schemeClr>
+          </a:lnRef>
+          <a:fillRef idx="1">
+            <a:schemeClr val="accent1"/>
+          </a:fillRef>
+          <a:effectRef idx="0">
+            <a:schemeClr val="accent1"/>
+          </a:effectRef>
+          <a:fontRef idx="minor">
+            <a:schemeClr val="lt1"/>
+          </a:fontRef>
+        </p:style>
+        <p:txBody>
+          <a:bodyPr rtlCol="0" anchor="ctr"/>
+          <a:lstStyle/>
+          <a:p>
+            <a:pPr algn="ctr"/>
+            <a:endParaRPr lang="pt-BR"/>
+          </a:p>
+        </p:txBody>
+      </p:sp>
       <p:grpSp>
         <p:nvGrpSpPr>
-          <p:cNvPr id="4" name="Agrupar 3">
-            <a:extLst>
-              <a:ext uri="{FF2B5EF4-FFF2-40B4-BE49-F238E27FC236}">
-                <a16:creationId xmlns:a16="http://schemas.microsoft.com/office/drawing/2014/main" id="{3F0F17FF-7776-E369-B319-F77270B435EB}"/>
+          <p:cNvPr id="5" name="Agrupar 4">
+            <a:extLst>
+              <a:ext uri="{FF2B5EF4-FFF2-40B4-BE49-F238E27FC236}">
+                <a16:creationId xmlns:a16="http://schemas.microsoft.com/office/drawing/2014/main" id="{9F32ABA6-EAB0-C3F8-2E9E-0B8D4C4BDA83}"/>
               </a:ext>
             </a:extLst>
           </p:cNvPr>
@@ -3677,18 +3833,57 @@
         </p:nvGrpSpPr>
         <p:grpSpPr>
           <a:xfrm>
-            <a:off x="594764" y="1129268"/>
-            <a:ext cx="11008389" cy="5404720"/>
-            <a:chOff x="470163" y="860322"/>
-            <a:chExt cx="11008389" cy="5404720"/>
+            <a:off x="9081580" y="1130885"/>
+            <a:ext cx="2520737" cy="2515078"/>
+            <a:chOff x="8957815" y="860322"/>
+            <a:chExt cx="2520737" cy="2515078"/>
           </a:xfrm>
         </p:grpSpPr>
+        <p:sp>
+          <p:nvSpPr>
+            <p:cNvPr id="32" name="CaixaDeTexto 31">
+              <a:extLst>
+                <a:ext uri="{FF2B5EF4-FFF2-40B4-BE49-F238E27FC236}">
+                  <a16:creationId xmlns:a16="http://schemas.microsoft.com/office/drawing/2014/main" id="{B394063E-7FF3-7102-A5FD-16FE1420BA3B}"/>
+                </a:ext>
+              </a:extLst>
+            </p:cNvPr>
+            <p:cNvSpPr txBox="1"/>
+            <p:nvPr/>
+          </p:nvSpPr>
+          <p:spPr>
+            <a:xfrm>
+              <a:off x="9069373" y="2729069"/>
+              <a:ext cx="2409179" cy="646331"/>
+            </a:xfrm>
+            <a:prstGeom prst="rect">
+              <a:avLst/>
+            </a:prstGeom>
+            <a:noFill/>
+          </p:spPr>
+          <p:txBody>
+            <a:bodyPr wrap="square" rtlCol="0">
+              <a:spAutoFit/>
+            </a:bodyPr>
+            <a:lstStyle/>
+            <a:p>
+              <a:pPr algn="ctr"/>
+              <a:r>
+                <a:rPr lang="pt-BR" b="1" dirty="0">
+                  <a:latin typeface="Arial" panose="020B0604020202020204" pitchFamily="34" charset="0"/>
+                  <a:cs typeface="Arial" panose="020B0604020202020204" pitchFamily="34" charset="0"/>
+                </a:rPr>
+                <a:t>Resolução de problemas </a:t>
+              </a:r>
+            </a:p>
+          </p:txBody>
+        </p:sp>
         <p:grpSp>
           <p:nvGrpSpPr>
-            <p:cNvPr id="5" name="Agrupar 4">
+            <p:cNvPr id="33" name="Agrupar 32">
               <a:extLst>
                 <a:ext uri="{FF2B5EF4-FFF2-40B4-BE49-F238E27FC236}">
-                  <a16:creationId xmlns:a16="http://schemas.microsoft.com/office/drawing/2014/main" id="{9F32ABA6-EAB0-C3F8-2E9E-0B8D4C4BDA83}"/>
+                  <a16:creationId xmlns:a16="http://schemas.microsoft.com/office/drawing/2014/main" id="{C1C95505-B0D9-E275-1C07-F35B8E13FE41}"/>
                 </a:ext>
               </a:extLst>
             </p:cNvPr>
@@ -3698,56 +3893,17 @@
           <p:grpSpPr>
             <a:xfrm>
               <a:off x="8957815" y="860322"/>
-              <a:ext cx="2520737" cy="2515078"/>
-              <a:chOff x="8957815" y="860322"/>
-              <a:chExt cx="2520737" cy="2515078"/>
+              <a:ext cx="2178755" cy="1961707"/>
+              <a:chOff x="8705271" y="872532"/>
+              <a:chExt cx="2178755" cy="1961707"/>
             </a:xfrm>
           </p:grpSpPr>
-          <p:sp>
-            <p:nvSpPr>
-              <p:cNvPr id="32" name="CaixaDeTexto 31">
+          <p:grpSp>
+            <p:nvGrpSpPr>
+              <p:cNvPr id="34" name="Agrupar 33">
                 <a:extLst>
                   <a:ext uri="{FF2B5EF4-FFF2-40B4-BE49-F238E27FC236}">
-                    <a16:creationId xmlns:a16="http://schemas.microsoft.com/office/drawing/2014/main" id="{B394063E-7FF3-7102-A5FD-16FE1420BA3B}"/>
-                  </a:ext>
-                </a:extLst>
-              </p:cNvPr>
-              <p:cNvSpPr txBox="1"/>
-              <p:nvPr/>
-            </p:nvSpPr>
-            <p:spPr>
-              <a:xfrm>
-                <a:off x="9069373" y="2729069"/>
-                <a:ext cx="2409179" cy="646331"/>
-              </a:xfrm>
-              <a:prstGeom prst="rect">
-                <a:avLst/>
-              </a:prstGeom>
-              <a:noFill/>
-            </p:spPr>
-            <p:txBody>
-              <a:bodyPr wrap="square" rtlCol="0">
-                <a:spAutoFit/>
-              </a:bodyPr>
-              <a:lstStyle/>
-              <a:p>
-                <a:pPr algn="ctr"/>
-                <a:r>
-                  <a:rPr lang="pt-BR" b="1" dirty="0">
-                    <a:latin typeface="Arial" panose="020B0604020202020204" pitchFamily="34" charset="0"/>
-                    <a:cs typeface="Arial" panose="020B0604020202020204" pitchFamily="34" charset="0"/>
-                  </a:rPr>
-                  <a:t>Resolução de problemas </a:t>
-                </a:r>
-              </a:p>
-            </p:txBody>
-          </p:sp>
-          <p:grpSp>
-            <p:nvGrpSpPr>
-              <p:cNvPr id="33" name="Agrupar 32">
-                <a:extLst>
-                  <a:ext uri="{FF2B5EF4-FFF2-40B4-BE49-F238E27FC236}">
-                    <a16:creationId xmlns:a16="http://schemas.microsoft.com/office/drawing/2014/main" id="{C1C95505-B0D9-E275-1C07-F35B8E13FE41}"/>
+                    <a16:creationId xmlns:a16="http://schemas.microsoft.com/office/drawing/2014/main" id="{B826A9B4-4156-69EB-DAEC-D3ED6032DA4E}"/>
                   </a:ext>
                 </a:extLst>
               </p:cNvPr>
@@ -3756,759 +3912,18 @@
             </p:nvGrpSpPr>
             <p:grpSpPr>
               <a:xfrm>
-                <a:off x="8957815" y="860322"/>
-                <a:ext cx="2178755" cy="1961707"/>
-                <a:chOff x="8705271" y="872532"/>
-                <a:chExt cx="2178755" cy="1961707"/>
-              </a:xfrm>
-            </p:grpSpPr>
-            <p:grpSp>
-              <p:nvGrpSpPr>
-                <p:cNvPr id="34" name="Agrupar 33">
-                  <a:extLst>
-                    <a:ext uri="{FF2B5EF4-FFF2-40B4-BE49-F238E27FC236}">
-                      <a16:creationId xmlns:a16="http://schemas.microsoft.com/office/drawing/2014/main" id="{B826A9B4-4156-69EB-DAEC-D3ED6032DA4E}"/>
-                    </a:ext>
-                  </a:extLst>
-                </p:cNvPr>
-                <p:cNvGrpSpPr/>
-                <p:nvPr/>
-              </p:nvGrpSpPr>
-              <p:grpSpPr>
-                <a:xfrm>
-                  <a:off x="8952948" y="872532"/>
-                  <a:ext cx="1931078" cy="1961707"/>
-                  <a:chOff x="8935192" y="881410"/>
-                  <a:chExt cx="1931078" cy="1961707"/>
-                </a:xfrm>
-              </p:grpSpPr>
-              <p:pic>
-                <p:nvPicPr>
-                  <p:cNvPr id="36" name="Gráfico 35" descr="Computador">
-                    <a:extLst>
-                      <a:ext uri="{FF2B5EF4-FFF2-40B4-BE49-F238E27FC236}">
-                        <a16:creationId xmlns:a16="http://schemas.microsoft.com/office/drawing/2014/main" id="{1DFC4725-3167-8225-1B3A-E9742AB016D1}"/>
-                      </a:ext>
-                    </a:extLst>
-                  </p:cNvPr>
-                  <p:cNvPicPr>
-                    <a:picLocks noChangeAspect="1"/>
-                  </p:cNvPicPr>
-                  <p:nvPr/>
-                </p:nvPicPr>
-                <p:blipFill>
-                  <a:blip r:embed="rId2">
-                    <a:extLst>
-                      <a:ext uri="{28A0092B-C50C-407E-A947-70E740481C1C}">
-                        <a14:useLocalDpi xmlns:a14="http://schemas.microsoft.com/office/drawing/2010/main" val="0"/>
-                      </a:ext>
-                      <a:ext uri="{96DAC541-7B7A-43D3-8B79-37D633B846F1}">
-                        <asvg:svgBlip xmlns:asvg="http://schemas.microsoft.com/office/drawing/2016/SVG/main" r:embed="rId3"/>
-                      </a:ext>
-                    </a:extLst>
-                  </a:blip>
-                  <a:stretch>
-                    <a:fillRect/>
-                  </a:stretch>
-                </p:blipFill>
-                <p:spPr>
-                  <a:xfrm>
-                    <a:off x="8935192" y="881410"/>
-                    <a:ext cx="1931078" cy="1961707"/>
-                  </a:xfrm>
-                  <a:prstGeom prst="rect">
-                    <a:avLst/>
-                  </a:prstGeom>
-                </p:spPr>
-              </p:pic>
-              <p:pic>
-                <p:nvPicPr>
-                  <p:cNvPr id="37" name="Gráfico 36" descr="Lâmpada e lápis">
-                    <a:extLst>
-                      <a:ext uri="{FF2B5EF4-FFF2-40B4-BE49-F238E27FC236}">
-                        <a16:creationId xmlns:a16="http://schemas.microsoft.com/office/drawing/2014/main" id="{4AEC9847-C163-47C2-577B-01E04B618E41}"/>
-                      </a:ext>
-                    </a:extLst>
-                  </p:cNvPr>
-                  <p:cNvPicPr>
-                    <a:picLocks noChangeAspect="1"/>
-                  </p:cNvPicPr>
-                  <p:nvPr/>
-                </p:nvPicPr>
-                <p:blipFill>
-                  <a:blip r:embed="rId4">
-                    <a:extLst>
-                      <a:ext uri="{28A0092B-C50C-407E-A947-70E740481C1C}">
-                        <a14:useLocalDpi xmlns:a14="http://schemas.microsoft.com/office/drawing/2010/main" val="0"/>
-                      </a:ext>
-                      <a:ext uri="{96DAC541-7B7A-43D3-8B79-37D633B846F1}">
-                        <asvg:svgBlip xmlns:asvg="http://schemas.microsoft.com/office/drawing/2016/SVG/main" r:embed="rId5"/>
-                      </a:ext>
-                    </a:extLst>
-                  </a:blip>
-                  <a:stretch>
-                    <a:fillRect/>
-                  </a:stretch>
-                </p:blipFill>
-                <p:spPr>
-                  <a:xfrm>
-                    <a:off x="9294074" y="1437421"/>
-                    <a:ext cx="616674" cy="626455"/>
-                  </a:xfrm>
-                  <a:prstGeom prst="rect">
-                    <a:avLst/>
-                  </a:prstGeom>
-                </p:spPr>
-              </p:pic>
-            </p:grpSp>
-            <p:pic>
-              <p:nvPicPr>
-                <p:cNvPr id="35" name="Gráfico 34" descr="Cabeça com engrenagens">
-                  <a:extLst>
-                    <a:ext uri="{FF2B5EF4-FFF2-40B4-BE49-F238E27FC236}">
-                      <a16:creationId xmlns:a16="http://schemas.microsoft.com/office/drawing/2014/main" id="{B99F9E04-A990-2AAA-CDD1-FAB9F352E593}"/>
-                    </a:ext>
-                  </a:extLst>
-                </p:cNvPr>
-                <p:cNvPicPr>
-                  <a:picLocks noChangeAspect="1"/>
-                </p:cNvPicPr>
-                <p:nvPr/>
-              </p:nvPicPr>
-              <p:blipFill>
-                <a:blip r:embed="rId6">
-                  <a:extLst>
-                    <a:ext uri="{28A0092B-C50C-407E-A947-70E740481C1C}">
-                      <a14:useLocalDpi xmlns:a14="http://schemas.microsoft.com/office/drawing/2010/main" val="0"/>
-                    </a:ext>
-                    <a:ext uri="{96DAC541-7B7A-43D3-8B79-37D633B846F1}">
-                      <asvg:svgBlip xmlns:asvg="http://schemas.microsoft.com/office/drawing/2016/SVG/main" r:embed="rId7"/>
-                    </a:ext>
-                  </a:extLst>
-                </a:blip>
-                <a:stretch>
-                  <a:fillRect/>
-                </a:stretch>
-              </p:blipFill>
-              <p:spPr>
-                <a:xfrm>
-                  <a:off x="8705271" y="1982245"/>
-                  <a:ext cx="785745" cy="785745"/>
-                </a:xfrm>
-                <a:prstGeom prst="rect">
-                  <a:avLst/>
-                </a:prstGeom>
-              </p:spPr>
-            </p:pic>
-          </p:grpSp>
-        </p:grpSp>
-        <p:grpSp>
-          <p:nvGrpSpPr>
-            <p:cNvPr id="6" name="Agrupar 5">
-              <a:extLst>
-                <a:ext uri="{FF2B5EF4-FFF2-40B4-BE49-F238E27FC236}">
-                  <a16:creationId xmlns:a16="http://schemas.microsoft.com/office/drawing/2014/main" id="{113ED623-4BE5-DDA6-007B-6BC017F3D494}"/>
-                </a:ext>
-              </a:extLst>
-            </p:cNvPr>
-            <p:cNvGrpSpPr/>
-            <p:nvPr/>
-          </p:nvGrpSpPr>
-          <p:grpSpPr>
-            <a:xfrm>
-              <a:off x="736490" y="961412"/>
-              <a:ext cx="1669002" cy="2877682"/>
-              <a:chOff x="470162" y="1014679"/>
-              <a:chExt cx="1669002" cy="2877682"/>
-            </a:xfrm>
-          </p:grpSpPr>
-          <p:sp>
-            <p:nvSpPr>
-              <p:cNvPr id="28" name="CaixaDeTexto 27">
-                <a:extLst>
-                  <a:ext uri="{FF2B5EF4-FFF2-40B4-BE49-F238E27FC236}">
-                    <a16:creationId xmlns:a16="http://schemas.microsoft.com/office/drawing/2014/main" id="{BAE0D638-FAD9-EA37-A5C8-04DD76C66123}"/>
-                  </a:ext>
-                </a:extLst>
-              </p:cNvPr>
-              <p:cNvSpPr txBox="1"/>
-              <p:nvPr/>
-            </p:nvSpPr>
-            <p:spPr>
-              <a:xfrm>
-                <a:off x="787087" y="3246030"/>
-                <a:ext cx="1120604" cy="646331"/>
-              </a:xfrm>
-              <a:prstGeom prst="rect">
-                <a:avLst/>
-              </a:prstGeom>
-              <a:noFill/>
-            </p:spPr>
-            <p:txBody>
-              <a:bodyPr wrap="square" rtlCol="0">
-                <a:spAutoFit/>
-              </a:bodyPr>
-              <a:lstStyle/>
-              <a:p>
-                <a:pPr algn="ctr"/>
-                <a:r>
-                  <a:rPr lang="pt-BR" b="1" dirty="0">
-                    <a:latin typeface="Arial" panose="020B0604020202020204" pitchFamily="34" charset="0"/>
-                    <a:cs typeface="Arial" panose="020B0604020202020204" pitchFamily="34" charset="0"/>
-                  </a:rPr>
-                  <a:t>Usuário Final</a:t>
-                </a:r>
-              </a:p>
-            </p:txBody>
-          </p:sp>
-          <p:grpSp>
-            <p:nvGrpSpPr>
-              <p:cNvPr id="29" name="Agrupar 28">
-                <a:extLst>
-                  <a:ext uri="{FF2B5EF4-FFF2-40B4-BE49-F238E27FC236}">
-                    <a16:creationId xmlns:a16="http://schemas.microsoft.com/office/drawing/2014/main" id="{DF81B155-5B03-4AC0-D0E6-F1B5D294D1E4}"/>
-                  </a:ext>
-                </a:extLst>
-              </p:cNvPr>
-              <p:cNvGrpSpPr/>
-              <p:nvPr/>
-            </p:nvGrpSpPr>
-            <p:grpSpPr>
-              <a:xfrm>
-                <a:off x="470162" y="1014679"/>
-                <a:ext cx="1669002" cy="2206171"/>
-                <a:chOff x="476104" y="1080764"/>
-                <a:chExt cx="1669002" cy="2206171"/>
+                <a:off x="8952948" y="872532"/>
+                <a:ext cx="1931078" cy="1961707"/>
+                <a:chOff x="8935192" y="881410"/>
+                <a:chExt cx="1931078" cy="1961707"/>
               </a:xfrm>
             </p:grpSpPr>
             <p:pic>
               <p:nvPicPr>
-                <p:cNvPr id="30" name="Picture 2" descr="Laurenti">
+                <p:cNvPr id="36" name="Gráfico 35" descr="Computador">
                   <a:extLst>
                     <a:ext uri="{FF2B5EF4-FFF2-40B4-BE49-F238E27FC236}">
-                      <a16:creationId xmlns:a16="http://schemas.microsoft.com/office/drawing/2014/main" id="{F23D18A8-AC8C-ADEF-61E6-15D44AD0D1AB}"/>
-                    </a:ext>
-                  </a:extLst>
-                </p:cNvPr>
-                <p:cNvPicPr>
-                  <a:picLocks noChangeAspect="1" noChangeArrowheads="1"/>
-                </p:cNvPicPr>
-                <p:nvPr/>
-              </p:nvPicPr>
-              <p:blipFill rotWithShape="1">
-                <a:blip r:embed="rId8">
-                  <a:extLst>
-                    <a:ext uri="{28A0092B-C50C-407E-A947-70E740481C1C}">
-                      <a14:useLocalDpi xmlns:a14="http://schemas.microsoft.com/office/drawing/2010/main" val="0"/>
-                    </a:ext>
-                  </a:extLst>
-                </a:blip>
-                <a:srcRect l="15213" r="14560"/>
-                <a:stretch/>
-              </p:blipFill>
-              <p:spPr bwMode="auto">
-                <a:xfrm>
-                  <a:off x="476104" y="1080764"/>
-                  <a:ext cx="1669002" cy="2206171"/>
-                </a:xfrm>
-                <a:prstGeom prst="rect">
-                  <a:avLst/>
-                </a:prstGeom>
-                <a:noFill/>
-                <a:extLst>
-                  <a:ext uri="{909E8E84-426E-40DD-AFC4-6F175D3DCCD1}">
-                    <a14:hiddenFill xmlns:a14="http://schemas.microsoft.com/office/drawing/2010/main">
-                      <a:solidFill>
-                        <a:srgbClr val="FFFFFF"/>
-                      </a:solidFill>
-                    </a14:hiddenFill>
-                  </a:ext>
-                </a:extLst>
-              </p:spPr>
-            </p:pic>
-            <p:pic>
-              <p:nvPicPr>
-                <p:cNvPr id="31" name="Gráfico 30" descr="Aviso">
-                  <a:extLst>
-                    <a:ext uri="{FF2B5EF4-FFF2-40B4-BE49-F238E27FC236}">
-                      <a16:creationId xmlns:a16="http://schemas.microsoft.com/office/drawing/2014/main" id="{6D41EB57-2C3B-0FF9-AAA5-BD22A4352D47}"/>
-                    </a:ext>
-                  </a:extLst>
-                </p:cNvPr>
-                <p:cNvPicPr>
-                  <a:picLocks noChangeAspect="1"/>
-                </p:cNvPicPr>
-                <p:nvPr/>
-              </p:nvPicPr>
-              <p:blipFill>
-                <a:blip r:embed="rId9">
-                  <a:extLst>
-                    <a:ext uri="{28A0092B-C50C-407E-A947-70E740481C1C}">
-                      <a14:useLocalDpi xmlns:a14="http://schemas.microsoft.com/office/drawing/2010/main" val="0"/>
-                    </a:ext>
-                    <a:ext uri="{96DAC541-7B7A-43D3-8B79-37D633B846F1}">
-                      <asvg:svgBlip xmlns:asvg="http://schemas.microsoft.com/office/drawing/2016/SVG/main" r:embed="rId10"/>
-                    </a:ext>
-                  </a:extLst>
-                </a:blip>
-                <a:stretch>
-                  <a:fillRect/>
-                </a:stretch>
-              </p:blipFill>
-              <p:spPr>
-                <a:xfrm>
-                  <a:off x="1019622" y="1222501"/>
-                  <a:ext cx="588544" cy="588544"/>
-                </a:xfrm>
-                <a:prstGeom prst="rect">
-                  <a:avLst/>
-                </a:prstGeom>
-              </p:spPr>
-            </p:pic>
-          </p:grpSp>
-        </p:grpSp>
-        <p:grpSp>
-          <p:nvGrpSpPr>
-            <p:cNvPr id="7" name="Agrupar 6">
-              <a:extLst>
-                <a:ext uri="{FF2B5EF4-FFF2-40B4-BE49-F238E27FC236}">
-                  <a16:creationId xmlns:a16="http://schemas.microsoft.com/office/drawing/2014/main" id="{14F68128-2F3A-DB06-C2E7-4891F0E9E3AB}"/>
-                </a:ext>
-              </a:extLst>
-            </p:cNvPr>
-            <p:cNvGrpSpPr/>
-            <p:nvPr/>
-          </p:nvGrpSpPr>
-          <p:grpSpPr>
-            <a:xfrm>
-              <a:off x="2310830" y="3844367"/>
-              <a:ext cx="2943085" cy="2420675"/>
-              <a:chOff x="2088885" y="3844368"/>
-              <a:chExt cx="2943085" cy="2420675"/>
-            </a:xfrm>
-          </p:grpSpPr>
-          <p:grpSp>
-            <p:nvGrpSpPr>
-              <p:cNvPr id="23" name="Agrupar 22">
-                <a:extLst>
-                  <a:ext uri="{FF2B5EF4-FFF2-40B4-BE49-F238E27FC236}">
-                    <a16:creationId xmlns:a16="http://schemas.microsoft.com/office/drawing/2014/main" id="{B51C2C9A-F24E-794C-62DB-B7FA8164E36C}"/>
-                  </a:ext>
-                </a:extLst>
-              </p:cNvPr>
-              <p:cNvGrpSpPr/>
-              <p:nvPr/>
-            </p:nvGrpSpPr>
-            <p:grpSpPr>
-              <a:xfrm>
-                <a:off x="2587240" y="3844368"/>
-                <a:ext cx="2444730" cy="2174691"/>
-                <a:chOff x="2658261" y="3826612"/>
-                <a:chExt cx="2444730" cy="2174691"/>
-              </a:xfrm>
-            </p:grpSpPr>
-            <p:pic>
-              <p:nvPicPr>
-                <p:cNvPr id="25" name="Gráfico 24" descr="Computador">
-                  <a:extLst>
-                    <a:ext uri="{FF2B5EF4-FFF2-40B4-BE49-F238E27FC236}">
-                      <a16:creationId xmlns:a16="http://schemas.microsoft.com/office/drawing/2014/main" id="{6CABDB6B-CCF8-F1D9-826D-D3380EA47732}"/>
-                    </a:ext>
-                  </a:extLst>
-                </p:cNvPr>
-                <p:cNvPicPr>
-                  <a:picLocks noChangeAspect="1"/>
-                </p:cNvPicPr>
-                <p:nvPr/>
-              </p:nvPicPr>
-              <p:blipFill>
-                <a:blip r:embed="rId2">
-                  <a:extLst>
-                    <a:ext uri="{28A0092B-C50C-407E-A947-70E740481C1C}">
-                      <a14:useLocalDpi xmlns:a14="http://schemas.microsoft.com/office/drawing/2010/main" val="0"/>
-                    </a:ext>
-                    <a:ext uri="{96DAC541-7B7A-43D3-8B79-37D633B846F1}">
-                      <asvg:svgBlip xmlns:asvg="http://schemas.microsoft.com/office/drawing/2016/SVG/main" r:embed="rId11"/>
-                    </a:ext>
-                  </a:extLst>
-                </a:blip>
-                <a:stretch>
-                  <a:fillRect/>
-                </a:stretch>
-              </p:blipFill>
-              <p:spPr>
-                <a:xfrm>
-                  <a:off x="2824578" y="4092943"/>
-                  <a:ext cx="1801829" cy="1801829"/>
-                </a:xfrm>
-                <a:prstGeom prst="rect">
-                  <a:avLst/>
-                </a:prstGeom>
-              </p:spPr>
-            </p:pic>
-            <p:pic>
-              <p:nvPicPr>
-                <p:cNvPr id="26" name="Gráfico 25" descr="Baixar da nuvem">
-                  <a:extLst>
-                    <a:ext uri="{FF2B5EF4-FFF2-40B4-BE49-F238E27FC236}">
-                      <a16:creationId xmlns:a16="http://schemas.microsoft.com/office/drawing/2014/main" id="{D7D3970A-E72D-8927-BEC4-9192264E1279}"/>
-                    </a:ext>
-                  </a:extLst>
-                </p:cNvPr>
-                <p:cNvPicPr>
-                  <a:picLocks noChangeAspect="1"/>
-                </p:cNvPicPr>
-                <p:nvPr/>
-              </p:nvPicPr>
-              <p:blipFill>
-                <a:blip r:embed="rId12">
-                  <a:extLst>
-                    <a:ext uri="{28A0092B-C50C-407E-A947-70E740481C1C}">
-                      <a14:useLocalDpi xmlns:a14="http://schemas.microsoft.com/office/drawing/2010/main" val="0"/>
-                    </a:ext>
-                    <a:ext uri="{96DAC541-7B7A-43D3-8B79-37D633B846F1}">
-                      <asvg:svgBlip xmlns:asvg="http://schemas.microsoft.com/office/drawing/2016/SVG/main" r:embed="rId13"/>
-                    </a:ext>
-                  </a:extLst>
-                </a:blip>
-                <a:stretch>
-                  <a:fillRect/>
-                </a:stretch>
-              </p:blipFill>
-              <p:spPr>
-                <a:xfrm>
-                  <a:off x="2658261" y="3826612"/>
-                  <a:ext cx="914400" cy="914400"/>
-                </a:xfrm>
-                <a:prstGeom prst="rect">
-                  <a:avLst/>
-                </a:prstGeom>
-              </p:spPr>
-            </p:pic>
-            <p:pic>
-              <p:nvPicPr>
-                <p:cNvPr id="27" name="Gráfico 26" descr="Banco de dados">
-                  <a:extLst>
-                    <a:ext uri="{FF2B5EF4-FFF2-40B4-BE49-F238E27FC236}">
-                      <a16:creationId xmlns:a16="http://schemas.microsoft.com/office/drawing/2014/main" id="{0499CD9C-ABFC-0ABB-9495-F729492CDFEF}"/>
-                    </a:ext>
-                  </a:extLst>
-                </p:cNvPr>
-                <p:cNvPicPr>
-                  <a:picLocks noChangeAspect="1"/>
-                </p:cNvPicPr>
-                <p:nvPr/>
-              </p:nvPicPr>
-              <p:blipFill>
-                <a:blip r:embed="rId14">
-                  <a:extLst>
-                    <a:ext uri="{28A0092B-C50C-407E-A947-70E740481C1C}">
-                      <a14:useLocalDpi xmlns:a14="http://schemas.microsoft.com/office/drawing/2010/main" val="0"/>
-                    </a:ext>
-                    <a:ext uri="{96DAC541-7B7A-43D3-8B79-37D633B846F1}">
-                      <asvg:svgBlip xmlns:asvg="http://schemas.microsoft.com/office/drawing/2016/SVG/main" r:embed="rId15"/>
-                    </a:ext>
-                  </a:extLst>
-                </a:blip>
-                <a:stretch>
-                  <a:fillRect/>
-                </a:stretch>
-              </p:blipFill>
-              <p:spPr>
-                <a:xfrm>
-                  <a:off x="4274231" y="5172543"/>
-                  <a:ext cx="828760" cy="828760"/>
-                </a:xfrm>
-                <a:prstGeom prst="rect">
-                  <a:avLst/>
-                </a:prstGeom>
-              </p:spPr>
-            </p:pic>
-          </p:grpSp>
-          <p:sp>
-            <p:nvSpPr>
-              <p:cNvPr id="24" name="CaixaDeTexto 23">
-                <a:extLst>
-                  <a:ext uri="{FF2B5EF4-FFF2-40B4-BE49-F238E27FC236}">
-                    <a16:creationId xmlns:a16="http://schemas.microsoft.com/office/drawing/2014/main" id="{CBDD161F-1996-383C-A80F-BD93E7652464}"/>
-                  </a:ext>
-                </a:extLst>
-              </p:cNvPr>
-              <p:cNvSpPr txBox="1"/>
-              <p:nvPr/>
-            </p:nvSpPr>
-            <p:spPr>
-              <a:xfrm>
-                <a:off x="2088885" y="5618712"/>
-                <a:ext cx="2320362" cy="646331"/>
-              </a:xfrm>
-              <a:prstGeom prst="rect">
-                <a:avLst/>
-              </a:prstGeom>
-              <a:noFill/>
-            </p:spPr>
-            <p:txBody>
-              <a:bodyPr wrap="square" rtlCol="0">
-                <a:spAutoFit/>
-              </a:bodyPr>
-              <a:lstStyle/>
-              <a:p>
-                <a:pPr algn="ctr"/>
-                <a:r>
-                  <a:rPr lang="pt-BR" b="1" dirty="0">
-                    <a:latin typeface="Arial" panose="020B0604020202020204" pitchFamily="34" charset="0"/>
-                    <a:cs typeface="Arial" panose="020B0604020202020204" pitchFamily="34" charset="0"/>
-                  </a:rPr>
-                  <a:t>Acesso ao sistema de monitoramento</a:t>
-                </a:r>
-              </a:p>
-            </p:txBody>
-          </p:sp>
-        </p:grpSp>
-        <p:grpSp>
-          <p:nvGrpSpPr>
-            <p:cNvPr id="8" name="Agrupar 7">
-              <a:extLst>
-                <a:ext uri="{FF2B5EF4-FFF2-40B4-BE49-F238E27FC236}">
-                  <a16:creationId xmlns:a16="http://schemas.microsoft.com/office/drawing/2014/main" id="{F9AA3573-E593-BC2F-F270-EF444582CADC}"/>
-                </a:ext>
-              </a:extLst>
-            </p:cNvPr>
-            <p:cNvGrpSpPr/>
-            <p:nvPr/>
-          </p:nvGrpSpPr>
-          <p:grpSpPr>
-            <a:xfrm>
-              <a:off x="4040484" y="1098525"/>
-              <a:ext cx="2253784" cy="2165266"/>
-              <a:chOff x="3925069" y="1418121"/>
-              <a:chExt cx="2253784" cy="2165266"/>
-            </a:xfrm>
-          </p:grpSpPr>
-          <p:grpSp>
-            <p:nvGrpSpPr>
-              <p:cNvPr id="18" name="Agrupar 17">
-                <a:extLst>
-                  <a:ext uri="{FF2B5EF4-FFF2-40B4-BE49-F238E27FC236}">
-                    <a16:creationId xmlns:a16="http://schemas.microsoft.com/office/drawing/2014/main" id="{B5137A70-B7F1-72F2-0FDE-902CBCD9462E}"/>
-                  </a:ext>
-                </a:extLst>
-              </p:cNvPr>
-              <p:cNvGrpSpPr/>
-              <p:nvPr/>
-            </p:nvGrpSpPr>
-            <p:grpSpPr>
-              <a:xfrm>
-                <a:off x="3925069" y="1418121"/>
-                <a:ext cx="2111744" cy="1666537"/>
-                <a:chOff x="4203210" y="2108639"/>
-                <a:chExt cx="1940675" cy="1560990"/>
-              </a:xfrm>
-            </p:grpSpPr>
-            <p:pic>
-              <p:nvPicPr>
-                <p:cNvPr id="21" name="Gráfico 20" descr="Apresentação com gráfico de barras">
-                  <a:extLst>
-                    <a:ext uri="{FF2B5EF4-FFF2-40B4-BE49-F238E27FC236}">
-                      <a16:creationId xmlns:a16="http://schemas.microsoft.com/office/drawing/2014/main" id="{EDDCE4C1-CD8A-345C-91CA-9E312CED6093}"/>
-                    </a:ext>
-                  </a:extLst>
-                </p:cNvPr>
-                <p:cNvPicPr>
-                  <a:picLocks noChangeAspect="1"/>
-                </p:cNvPicPr>
-                <p:nvPr/>
-              </p:nvPicPr>
-              <p:blipFill>
-                <a:blip r:embed="rId16">
-                  <a:extLst>
-                    <a:ext uri="{28A0092B-C50C-407E-A947-70E740481C1C}">
-                      <a14:useLocalDpi xmlns:a14="http://schemas.microsoft.com/office/drawing/2010/main" val="0"/>
-                    </a:ext>
-                    <a:ext uri="{96DAC541-7B7A-43D3-8B79-37D633B846F1}">
-                      <asvg:svgBlip xmlns:asvg="http://schemas.microsoft.com/office/drawing/2016/SVG/main" r:embed="rId17"/>
-                    </a:ext>
-                  </a:extLst>
-                </a:blip>
-                <a:stretch>
-                  <a:fillRect/>
-                </a:stretch>
-              </p:blipFill>
-              <p:spPr>
-                <a:xfrm>
-                  <a:off x="4582895" y="2108639"/>
-                  <a:ext cx="1560990" cy="1560990"/>
-                </a:xfrm>
-                <a:prstGeom prst="rect">
-                  <a:avLst/>
-                </a:prstGeom>
-              </p:spPr>
-            </p:pic>
-            <p:pic>
-              <p:nvPicPr>
-                <p:cNvPr id="22" name="Gráfico 21" descr="Gráfico de pizza">
-                  <a:extLst>
-                    <a:ext uri="{FF2B5EF4-FFF2-40B4-BE49-F238E27FC236}">
-                      <a16:creationId xmlns:a16="http://schemas.microsoft.com/office/drawing/2014/main" id="{4E57DAB1-0CDB-B1C1-1EF3-8C2B8EC47B8B}"/>
-                    </a:ext>
-                  </a:extLst>
-                </p:cNvPr>
-                <p:cNvPicPr>
-                  <a:picLocks noChangeAspect="1"/>
-                </p:cNvPicPr>
-                <p:nvPr/>
-              </p:nvPicPr>
-              <p:blipFill>
-                <a:blip r:embed="rId18">
-                  <a:extLst>
-                    <a:ext uri="{28A0092B-C50C-407E-A947-70E740481C1C}">
-                      <a14:useLocalDpi xmlns:a14="http://schemas.microsoft.com/office/drawing/2010/main" val="0"/>
-                    </a:ext>
-                    <a:ext uri="{96DAC541-7B7A-43D3-8B79-37D633B846F1}">
-                      <asvg:svgBlip xmlns:asvg="http://schemas.microsoft.com/office/drawing/2016/SVG/main" r:embed="rId19"/>
-                    </a:ext>
-                  </a:extLst>
-                </a:blip>
-                <a:stretch>
-                  <a:fillRect/>
-                </a:stretch>
-              </p:blipFill>
-              <p:spPr>
-                <a:xfrm>
-                  <a:off x="4203210" y="2108639"/>
-                  <a:ext cx="914400" cy="914400"/>
-                </a:xfrm>
-                <a:prstGeom prst="rect">
-                  <a:avLst/>
-                </a:prstGeom>
-              </p:spPr>
-            </p:pic>
-          </p:grpSp>
-          <p:sp>
-            <p:nvSpPr>
-              <p:cNvPr id="19" name="CaixaDeTexto 18">
-                <a:extLst>
-                  <a:ext uri="{FF2B5EF4-FFF2-40B4-BE49-F238E27FC236}">
-                    <a16:creationId xmlns:a16="http://schemas.microsoft.com/office/drawing/2014/main" id="{EECB7940-6264-05CD-DF78-C41251CAF551}"/>
-                  </a:ext>
-                </a:extLst>
-              </p:cNvPr>
-              <p:cNvSpPr txBox="1"/>
-              <p:nvPr/>
-            </p:nvSpPr>
-            <p:spPr>
-              <a:xfrm>
-                <a:off x="4098356" y="2937056"/>
-                <a:ext cx="2080497" cy="646331"/>
-              </a:xfrm>
-              <a:prstGeom prst="rect">
-                <a:avLst/>
-              </a:prstGeom>
-              <a:noFill/>
-            </p:spPr>
-            <p:txBody>
-              <a:bodyPr wrap="square" rtlCol="0">
-                <a:spAutoFit/>
-              </a:bodyPr>
-              <a:lstStyle/>
-              <a:p>
-                <a:pPr algn="ctr"/>
-                <a:r>
-                  <a:rPr lang="pt-BR" b="1" dirty="0">
-                    <a:latin typeface="Arial" panose="020B0604020202020204" pitchFamily="34" charset="0"/>
-                    <a:cs typeface="Arial" panose="020B0604020202020204" pitchFamily="34" charset="0"/>
-                  </a:rPr>
-                  <a:t>Dashboard em tempo real</a:t>
-                </a:r>
-              </a:p>
-            </p:txBody>
-          </p:sp>
-          <p:pic>
-            <p:nvPicPr>
-              <p:cNvPr id="20" name="Gráfico 19" descr="Lupa">
-                <a:extLst>
-                  <a:ext uri="{FF2B5EF4-FFF2-40B4-BE49-F238E27FC236}">
-                    <a16:creationId xmlns:a16="http://schemas.microsoft.com/office/drawing/2014/main" id="{B710DEEE-372B-0FEE-CF77-13C47B4B60B3}"/>
-                  </a:ext>
-                </a:extLst>
-              </p:cNvPr>
-              <p:cNvPicPr>
-                <a:picLocks noChangeAspect="1"/>
-              </p:cNvPicPr>
-              <p:nvPr/>
-            </p:nvPicPr>
-            <p:blipFill>
-              <a:blip r:embed="rId20">
-                <a:extLst>
-                  <a:ext uri="{28A0092B-C50C-407E-A947-70E740481C1C}">
-                    <a14:useLocalDpi xmlns:a14="http://schemas.microsoft.com/office/drawing/2010/main" val="0"/>
-                  </a:ext>
-                  <a:ext uri="{96DAC541-7B7A-43D3-8B79-37D633B846F1}">
-                    <asvg:svgBlip xmlns:asvg="http://schemas.microsoft.com/office/drawing/2016/SVG/main" r:embed="rId21"/>
-                  </a:ext>
-                </a:extLst>
-              </a:blip>
-              <a:stretch>
-                <a:fillRect/>
-              </a:stretch>
-            </p:blipFill>
-            <p:spPr>
-              <a:xfrm>
-                <a:off x="5490155" y="1881605"/>
-                <a:ext cx="655565" cy="655565"/>
-              </a:xfrm>
-              <a:prstGeom prst="rect">
-                <a:avLst/>
-              </a:prstGeom>
-            </p:spPr>
-          </p:pic>
-        </p:grpSp>
-        <p:grpSp>
-          <p:nvGrpSpPr>
-            <p:cNvPr id="9" name="Agrupar 8">
-              <a:extLst>
-                <a:ext uri="{FF2B5EF4-FFF2-40B4-BE49-F238E27FC236}">
-                  <a16:creationId xmlns:a16="http://schemas.microsoft.com/office/drawing/2014/main" id="{8ACEBB6C-FE8D-3D19-4653-522FE6B22791}"/>
-                </a:ext>
-              </a:extLst>
-            </p:cNvPr>
-            <p:cNvGrpSpPr/>
-            <p:nvPr/>
-          </p:nvGrpSpPr>
-          <p:grpSpPr>
-            <a:xfrm>
-              <a:off x="6527488" y="3343453"/>
-              <a:ext cx="2409179" cy="2487134"/>
-              <a:chOff x="6456469" y="4035915"/>
-              <a:chExt cx="2409179" cy="2487134"/>
-            </a:xfrm>
-          </p:grpSpPr>
-          <p:grpSp>
-            <p:nvGrpSpPr>
-              <p:cNvPr id="14" name="Agrupar 13">
-                <a:extLst>
-                  <a:ext uri="{FF2B5EF4-FFF2-40B4-BE49-F238E27FC236}">
-                    <a16:creationId xmlns:a16="http://schemas.microsoft.com/office/drawing/2014/main" id="{88D72902-EDC8-EF46-0FBE-1C770A952396}"/>
-                  </a:ext>
-                </a:extLst>
-              </p:cNvPr>
-              <p:cNvGrpSpPr/>
-              <p:nvPr/>
-            </p:nvGrpSpPr>
-            <p:grpSpPr>
-              <a:xfrm>
-                <a:off x="6748381" y="4035915"/>
-                <a:ext cx="1801829" cy="1801829"/>
-                <a:chOff x="6814659" y="3766213"/>
-                <a:chExt cx="1801829" cy="1801829"/>
-              </a:xfrm>
-            </p:grpSpPr>
-            <p:pic>
-              <p:nvPicPr>
-                <p:cNvPr id="16" name="Gráfico 15" descr="Computador">
-                  <a:extLst>
-                    <a:ext uri="{FF2B5EF4-FFF2-40B4-BE49-F238E27FC236}">
-                      <a16:creationId xmlns:a16="http://schemas.microsoft.com/office/drawing/2014/main" id="{B523CF9B-6FB9-160D-738A-CC5C64839504}"/>
+                      <a16:creationId xmlns:a16="http://schemas.microsoft.com/office/drawing/2014/main" id="{1DFC4725-3167-8225-1B3A-E9742AB016D1}"/>
                     </a:ext>
                   </a:extLst>
                 </p:cNvPr>
@@ -4534,8 +3949,8 @@
               </p:blipFill>
               <p:spPr>
                 <a:xfrm>
-                  <a:off x="6814659" y="3766213"/>
-                  <a:ext cx="1801829" cy="1801829"/>
+                  <a:off x="8935192" y="881410"/>
+                  <a:ext cx="1931078" cy="1961707"/>
                 </a:xfrm>
                 <a:prstGeom prst="rect">
                   <a:avLst/>
@@ -4544,10 +3959,10 @@
             </p:pic>
             <p:pic>
               <p:nvPicPr>
-                <p:cNvPr id="17" name="Gráfico 16" descr="Sirene">
+                <p:cNvPr id="37" name="Gráfico 36" descr="Lâmpada e lápis">
                   <a:extLst>
                     <a:ext uri="{FF2B5EF4-FFF2-40B4-BE49-F238E27FC236}">
-                      <a16:creationId xmlns:a16="http://schemas.microsoft.com/office/drawing/2014/main" id="{B9EADA90-D48C-476F-29BB-5602BDCDB155}"/>
+                      <a16:creationId xmlns:a16="http://schemas.microsoft.com/office/drawing/2014/main" id="{4AEC9847-C163-47C2-577B-01E04B618E41}"/>
                     </a:ext>
                   </a:extLst>
                 </p:cNvPr>
@@ -4557,13 +3972,13 @@
                 <p:nvPr/>
               </p:nvPicPr>
               <p:blipFill>
-                <a:blip r:embed="rId22">
+                <a:blip r:embed="rId4">
                   <a:extLst>
                     <a:ext uri="{28A0092B-C50C-407E-A947-70E740481C1C}">
                       <a14:useLocalDpi xmlns:a14="http://schemas.microsoft.com/office/drawing/2010/main" val="0"/>
                     </a:ext>
                     <a:ext uri="{96DAC541-7B7A-43D3-8B79-37D633B846F1}">
-                      <asvg:svgBlip xmlns:asvg="http://schemas.microsoft.com/office/drawing/2016/SVG/main" r:embed="rId23"/>
+                      <asvg:svgBlip xmlns:asvg="http://schemas.microsoft.com/office/drawing/2016/SVG/main" r:embed="rId5"/>
                     </a:ext>
                   </a:extLst>
                 </a:blip>
@@ -4573,8 +3988,8 @@
               </p:blipFill>
               <p:spPr>
                 <a:xfrm>
-                  <a:off x="7031110" y="4156512"/>
-                  <a:ext cx="761717" cy="761717"/>
+                  <a:off x="9294074" y="1437421"/>
+                  <a:ext cx="616674" cy="626455"/>
                 </a:xfrm>
                 <a:prstGeom prst="rect">
                   <a:avLst/>
@@ -4582,235 +3997,1068 @@
               </p:spPr>
             </p:pic>
           </p:grpSp>
-          <p:sp>
-            <p:nvSpPr>
-              <p:cNvPr id="15" name="CaixaDeTexto 14">
+          <p:pic>
+            <p:nvPicPr>
+              <p:cNvPr id="35" name="Gráfico 34" descr="Cabeça com engrenagens">
                 <a:extLst>
                   <a:ext uri="{FF2B5EF4-FFF2-40B4-BE49-F238E27FC236}">
-                    <a16:creationId xmlns:a16="http://schemas.microsoft.com/office/drawing/2014/main" id="{B14F7EF8-5D5E-E4D1-CFCA-9AF46AC55432}"/>
+                    <a16:creationId xmlns:a16="http://schemas.microsoft.com/office/drawing/2014/main" id="{B99F9E04-A990-2AAA-CDD1-FAB9F352E593}"/>
                   </a:ext>
                 </a:extLst>
               </p:cNvPr>
-              <p:cNvSpPr txBox="1"/>
+              <p:cNvPicPr>
+                <a:picLocks noChangeAspect="1"/>
+              </p:cNvPicPr>
               <p:nvPr/>
-            </p:nvSpPr>
+            </p:nvPicPr>
+            <p:blipFill>
+              <a:blip r:embed="rId6">
+                <a:extLst>
+                  <a:ext uri="{28A0092B-C50C-407E-A947-70E740481C1C}">
+                    <a14:useLocalDpi xmlns:a14="http://schemas.microsoft.com/office/drawing/2010/main" val="0"/>
+                  </a:ext>
+                  <a:ext uri="{96DAC541-7B7A-43D3-8B79-37D633B846F1}">
+                    <asvg:svgBlip xmlns:asvg="http://schemas.microsoft.com/office/drawing/2016/SVG/main" r:embed="rId7"/>
+                  </a:ext>
+                </a:extLst>
+              </a:blip>
+              <a:stretch>
+                <a:fillRect/>
+              </a:stretch>
+            </p:blipFill>
             <p:spPr>
               <a:xfrm>
-                <a:off x="6456469" y="5599719"/>
-                <a:ext cx="2409179" cy="923330"/>
+                <a:off x="8705271" y="1982245"/>
+                <a:ext cx="785745" cy="785745"/>
+              </a:xfrm>
+              <a:prstGeom prst="rect">
+                <a:avLst/>
+              </a:prstGeom>
+            </p:spPr>
+          </p:pic>
+        </p:grpSp>
+      </p:grpSp>
+      <p:grpSp>
+        <p:nvGrpSpPr>
+          <p:cNvPr id="6" name="Agrupar 5">
+            <a:extLst>
+              <a:ext uri="{FF2B5EF4-FFF2-40B4-BE49-F238E27FC236}">
+                <a16:creationId xmlns:a16="http://schemas.microsoft.com/office/drawing/2014/main" id="{113ED623-4BE5-DDA6-007B-6BC017F3D494}"/>
+              </a:ext>
+            </a:extLst>
+          </p:cNvPr>
+          <p:cNvGrpSpPr/>
+          <p:nvPr/>
+        </p:nvGrpSpPr>
+        <p:grpSpPr>
+          <a:xfrm>
+            <a:off x="151791" y="1552111"/>
+            <a:ext cx="3222319" cy="2365742"/>
+            <a:chOff x="-505501" y="1014679"/>
+            <a:chExt cx="3708907" cy="2907913"/>
+          </a:xfrm>
+        </p:grpSpPr>
+        <p:sp>
+          <p:nvSpPr>
+            <p:cNvPr id="28" name="CaixaDeTexto 27">
+              <a:extLst>
+                <a:ext uri="{FF2B5EF4-FFF2-40B4-BE49-F238E27FC236}">
+                  <a16:creationId xmlns:a16="http://schemas.microsoft.com/office/drawing/2014/main" id="{BAE0D638-FAD9-EA37-A5C8-04DD76C66123}"/>
+                </a:ext>
+              </a:extLst>
+            </p:cNvPr>
+            <p:cNvSpPr txBox="1"/>
+            <p:nvPr/>
+          </p:nvSpPr>
+          <p:spPr>
+            <a:xfrm>
+              <a:off x="-505501" y="3128138"/>
+              <a:ext cx="3708907" cy="794454"/>
+            </a:xfrm>
+            <a:prstGeom prst="rect">
+              <a:avLst/>
+            </a:prstGeom>
+            <a:noFill/>
+          </p:spPr>
+          <p:txBody>
+            <a:bodyPr wrap="square" rtlCol="0">
+              <a:spAutoFit/>
+            </a:bodyPr>
+            <a:lstStyle/>
+            <a:p>
+              <a:pPr algn="ctr"/>
+              <a:r>
+                <a:rPr lang="pt-BR" b="1" dirty="0">
+                  <a:latin typeface="Arial" panose="020B0604020202020204" pitchFamily="34" charset="0"/>
+                  <a:cs typeface="Arial" panose="020B0604020202020204" pitchFamily="34" charset="0"/>
+                </a:rPr>
+                <a:t>Monitoramento dos totens de autoatendimento</a:t>
+              </a:r>
+            </a:p>
+          </p:txBody>
+        </p:sp>
+        <p:grpSp>
+          <p:nvGrpSpPr>
+            <p:cNvPr id="29" name="Agrupar 28">
+              <a:extLst>
+                <a:ext uri="{FF2B5EF4-FFF2-40B4-BE49-F238E27FC236}">
+                  <a16:creationId xmlns:a16="http://schemas.microsoft.com/office/drawing/2014/main" id="{DF81B155-5B03-4AC0-D0E6-F1B5D294D1E4}"/>
+                </a:ext>
+              </a:extLst>
+            </p:cNvPr>
+            <p:cNvGrpSpPr/>
+            <p:nvPr/>
+          </p:nvGrpSpPr>
+          <p:grpSpPr>
+            <a:xfrm>
+              <a:off x="470162" y="1014679"/>
+              <a:ext cx="1669002" cy="2206171"/>
+              <a:chOff x="476104" y="1080764"/>
+              <a:chExt cx="1669002" cy="2206171"/>
+            </a:xfrm>
+          </p:grpSpPr>
+          <p:pic>
+            <p:nvPicPr>
+              <p:cNvPr id="30" name="Picture 2" descr="Laurenti">
+                <a:extLst>
+                  <a:ext uri="{FF2B5EF4-FFF2-40B4-BE49-F238E27FC236}">
+                    <a16:creationId xmlns:a16="http://schemas.microsoft.com/office/drawing/2014/main" id="{F23D18A8-AC8C-ADEF-61E6-15D44AD0D1AB}"/>
+                  </a:ext>
+                </a:extLst>
+              </p:cNvPr>
+              <p:cNvPicPr>
+                <a:picLocks noChangeAspect="1" noChangeArrowheads="1"/>
+              </p:cNvPicPr>
+              <p:nvPr/>
+            </p:nvPicPr>
+            <p:blipFill rotWithShape="1">
+              <a:blip r:embed="rId8">
+                <a:extLst>
+                  <a:ext uri="{28A0092B-C50C-407E-A947-70E740481C1C}">
+                    <a14:useLocalDpi xmlns:a14="http://schemas.microsoft.com/office/drawing/2010/main" val="0"/>
+                  </a:ext>
+                </a:extLst>
+              </a:blip>
+              <a:srcRect l="15213" r="14560"/>
+              <a:stretch/>
+            </p:blipFill>
+            <p:spPr bwMode="auto">
+              <a:xfrm>
+                <a:off x="476104" y="1080764"/>
+                <a:ext cx="1669002" cy="2206171"/>
               </a:xfrm>
               <a:prstGeom prst="rect">
                 <a:avLst/>
               </a:prstGeom>
               <a:noFill/>
+              <a:extLst>
+                <a:ext uri="{909E8E84-426E-40DD-AFC4-6F175D3DCCD1}">
+                  <a14:hiddenFill xmlns:a14="http://schemas.microsoft.com/office/drawing/2010/main">
+                    <a:solidFill>
+                      <a:srgbClr val="FFFFFF"/>
+                    </a:solidFill>
+                  </a14:hiddenFill>
+                </a:ext>
+              </a:extLst>
             </p:spPr>
-            <p:txBody>
-              <a:bodyPr wrap="square" rtlCol="0">
-                <a:spAutoFit/>
-              </a:bodyPr>
-              <a:lstStyle/>
-              <a:p>
-                <a:pPr algn="ctr"/>
-                <a:r>
-                  <a:rPr lang="pt-BR" b="1" dirty="0">
-                    <a:latin typeface="Arial" panose="020B0604020202020204" pitchFamily="34" charset="0"/>
-                    <a:cs typeface="Arial" panose="020B0604020202020204" pitchFamily="34" charset="0"/>
-                  </a:rPr>
-                  <a:t>Alertas com base no monitoramento das dashboard</a:t>
-                </a:r>
-              </a:p>
-            </p:txBody>
-          </p:sp>
+          </p:pic>
+          <p:pic>
+            <p:nvPicPr>
+              <p:cNvPr id="31" name="Gráfico 30" descr="Aviso">
+                <a:extLst>
+                  <a:ext uri="{FF2B5EF4-FFF2-40B4-BE49-F238E27FC236}">
+                    <a16:creationId xmlns:a16="http://schemas.microsoft.com/office/drawing/2014/main" id="{6D41EB57-2C3B-0FF9-AAA5-BD22A4352D47}"/>
+                  </a:ext>
+                </a:extLst>
+              </p:cNvPr>
+              <p:cNvPicPr>
+                <a:picLocks noChangeAspect="1"/>
+              </p:cNvPicPr>
+              <p:nvPr/>
+            </p:nvPicPr>
+            <p:blipFill>
+              <a:blip r:embed="rId9">
+                <a:extLst>
+                  <a:ext uri="{28A0092B-C50C-407E-A947-70E740481C1C}">
+                    <a14:useLocalDpi xmlns:a14="http://schemas.microsoft.com/office/drawing/2010/main" val="0"/>
+                  </a:ext>
+                  <a:ext uri="{96DAC541-7B7A-43D3-8B79-37D633B846F1}">
+                    <asvg:svgBlip xmlns:asvg="http://schemas.microsoft.com/office/drawing/2016/SVG/main" r:embed="rId10"/>
+                  </a:ext>
+                </a:extLst>
+              </a:blip>
+              <a:stretch>
+                <a:fillRect/>
+              </a:stretch>
+            </p:blipFill>
+            <p:spPr>
+              <a:xfrm>
+                <a:off x="1019622" y="1222501"/>
+                <a:ext cx="588544" cy="588544"/>
+              </a:xfrm>
+              <a:prstGeom prst="rect">
+                <a:avLst/>
+              </a:prstGeom>
+            </p:spPr>
+          </p:pic>
         </p:grpSp>
-        <p:pic>
-          <p:nvPicPr>
-            <p:cNvPr id="10" name="Picture 2" descr="Pin em Coisas para comprar">
+      </p:grpSp>
+      <p:sp>
+        <p:nvSpPr>
+          <p:cNvPr id="44" name="Elipse 43">
+            <a:extLst>
+              <a:ext uri="{FF2B5EF4-FFF2-40B4-BE49-F238E27FC236}">
+                <a16:creationId xmlns:a16="http://schemas.microsoft.com/office/drawing/2014/main" id="{3094AA3A-07A0-DDB7-43EC-42374BA09BC5}"/>
+              </a:ext>
+            </a:extLst>
+          </p:cNvPr>
+          <p:cNvSpPr/>
+          <p:nvPr/>
+        </p:nvSpPr>
+        <p:spPr>
+          <a:xfrm>
+            <a:off x="2600889" y="4203535"/>
+            <a:ext cx="2480160" cy="2453216"/>
+          </a:xfrm>
+          <a:prstGeom prst="ellipse">
+            <a:avLst/>
+          </a:prstGeom>
+          <a:solidFill>
+            <a:schemeClr val="bg1"/>
+          </a:solidFill>
+          <a:ln>
+            <a:noFill/>
+          </a:ln>
+        </p:spPr>
+        <p:style>
+          <a:lnRef idx="2">
+            <a:schemeClr val="accent1">
+              <a:shade val="50000"/>
+            </a:schemeClr>
+          </a:lnRef>
+          <a:fillRef idx="1">
+            <a:schemeClr val="accent1"/>
+          </a:fillRef>
+          <a:effectRef idx="0">
+            <a:schemeClr val="accent1"/>
+          </a:effectRef>
+          <a:fontRef idx="minor">
+            <a:schemeClr val="lt1"/>
+          </a:fontRef>
+        </p:style>
+        <p:txBody>
+          <a:bodyPr rtlCol="0" anchor="ctr"/>
+          <a:lstStyle/>
+          <a:p>
+            <a:pPr algn="ctr"/>
+            <a:endParaRPr lang="pt-BR"/>
+          </a:p>
+        </p:txBody>
+      </p:sp>
+      <p:pic>
+        <p:nvPicPr>
+          <p:cNvPr id="25" name="Gráfico 24" descr="Computador">
+            <a:extLst>
+              <a:ext uri="{FF2B5EF4-FFF2-40B4-BE49-F238E27FC236}">
+                <a16:creationId xmlns:a16="http://schemas.microsoft.com/office/drawing/2014/main" id="{6CABDB6B-CCF8-F1D9-826D-D3380EA47732}"/>
+              </a:ext>
+            </a:extLst>
+          </p:cNvPr>
+          <p:cNvPicPr>
+            <a:picLocks noChangeAspect="1"/>
+          </p:cNvPicPr>
+          <p:nvPr/>
+        </p:nvPicPr>
+        <p:blipFill rotWithShape="1">
+          <a:blip r:embed="rId2">
+            <a:extLst>
+              <a:ext uri="{28A0092B-C50C-407E-A947-70E740481C1C}">
+                <a14:useLocalDpi xmlns:a14="http://schemas.microsoft.com/office/drawing/2010/main" val="0"/>
+              </a:ext>
+              <a:ext uri="{96DAC541-7B7A-43D3-8B79-37D633B846F1}">
+                <asvg:svgBlip xmlns:asvg="http://schemas.microsoft.com/office/drawing/2016/SVG/main" r:embed="rId11"/>
+              </a:ext>
+            </a:extLst>
+          </a:blip>
+          <a:srcRect l="65016"/>
+          <a:stretch/>
+        </p:blipFill>
+        <p:spPr>
+          <a:xfrm>
+            <a:off x="3366163" y="4379921"/>
+            <a:ext cx="630344" cy="1801829"/>
+          </a:xfrm>
+          <a:prstGeom prst="rect">
+            <a:avLst/>
+          </a:prstGeom>
+        </p:spPr>
+      </p:pic>
+      <p:sp>
+        <p:nvSpPr>
+          <p:cNvPr id="45" name="Elipse 44">
+            <a:extLst>
+              <a:ext uri="{FF2B5EF4-FFF2-40B4-BE49-F238E27FC236}">
+                <a16:creationId xmlns:a16="http://schemas.microsoft.com/office/drawing/2014/main" id="{6A18A09C-A68F-A458-E20C-41D2E957C911}"/>
+              </a:ext>
+            </a:extLst>
+          </p:cNvPr>
+          <p:cNvSpPr/>
+          <p:nvPr/>
+        </p:nvSpPr>
+        <p:spPr>
+          <a:xfrm>
+            <a:off x="4122457" y="1157946"/>
+            <a:ext cx="2480160" cy="2453216"/>
+          </a:xfrm>
+          <a:prstGeom prst="ellipse">
+            <a:avLst/>
+          </a:prstGeom>
+          <a:solidFill>
+            <a:schemeClr val="bg1"/>
+          </a:solidFill>
+          <a:ln>
+            <a:noFill/>
+          </a:ln>
+        </p:spPr>
+        <p:style>
+          <a:lnRef idx="2">
+            <a:schemeClr val="accent1">
+              <a:shade val="50000"/>
+            </a:schemeClr>
+          </a:lnRef>
+          <a:fillRef idx="1">
+            <a:schemeClr val="accent1"/>
+          </a:fillRef>
+          <a:effectRef idx="0">
+            <a:schemeClr val="accent1"/>
+          </a:effectRef>
+          <a:fontRef idx="minor">
+            <a:schemeClr val="lt1"/>
+          </a:fontRef>
+        </p:style>
+        <p:txBody>
+          <a:bodyPr rtlCol="0" anchor="ctr"/>
+          <a:lstStyle/>
+          <a:p>
+            <a:pPr algn="ctr"/>
+            <a:endParaRPr lang="pt-BR"/>
+          </a:p>
+        </p:txBody>
+      </p:sp>
+      <p:pic>
+        <p:nvPicPr>
+          <p:cNvPr id="26" name="Gráfico 25" descr="Baixar da nuvem">
+            <a:extLst>
+              <a:ext uri="{FF2B5EF4-FFF2-40B4-BE49-F238E27FC236}">
+                <a16:creationId xmlns:a16="http://schemas.microsoft.com/office/drawing/2014/main" id="{D7D3970A-E72D-8927-BEC4-9192264E1279}"/>
+              </a:ext>
+            </a:extLst>
+          </p:cNvPr>
+          <p:cNvPicPr>
+            <a:picLocks noChangeAspect="1"/>
+          </p:cNvPicPr>
+          <p:nvPr/>
+        </p:nvPicPr>
+        <p:blipFill>
+          <a:blip r:embed="rId12">
+            <a:extLst>
+              <a:ext uri="{28A0092B-C50C-407E-A947-70E740481C1C}">
+                <a14:useLocalDpi xmlns:a14="http://schemas.microsoft.com/office/drawing/2010/main" val="0"/>
+              </a:ext>
+              <a:ext uri="{96DAC541-7B7A-43D3-8B79-37D633B846F1}">
+                <asvg:svgBlip xmlns:asvg="http://schemas.microsoft.com/office/drawing/2016/SVG/main" r:embed="rId13"/>
+              </a:ext>
+            </a:extLst>
+          </a:blip>
+          <a:stretch>
+            <a:fillRect/>
+          </a:stretch>
+        </p:blipFill>
+        <p:spPr>
+          <a:xfrm>
+            <a:off x="2923287" y="4261803"/>
+            <a:ext cx="914400" cy="914400"/>
+          </a:xfrm>
+          <a:prstGeom prst="rect">
+            <a:avLst/>
+          </a:prstGeom>
+        </p:spPr>
+      </p:pic>
+      <p:pic>
+        <p:nvPicPr>
+          <p:cNvPr id="27" name="Gráfico 26" descr="Banco de dados">
+            <a:extLst>
+              <a:ext uri="{FF2B5EF4-FFF2-40B4-BE49-F238E27FC236}">
+                <a16:creationId xmlns:a16="http://schemas.microsoft.com/office/drawing/2014/main" id="{0499CD9C-ABFC-0ABB-9495-F729492CDFEF}"/>
+              </a:ext>
+            </a:extLst>
+          </p:cNvPr>
+          <p:cNvPicPr>
+            <a:picLocks noChangeAspect="1"/>
+          </p:cNvPicPr>
+          <p:nvPr/>
+        </p:nvPicPr>
+        <p:blipFill>
+          <a:blip r:embed="rId14">
+            <a:extLst>
+              <a:ext uri="{28A0092B-C50C-407E-A947-70E740481C1C}">
+                <a14:useLocalDpi xmlns:a14="http://schemas.microsoft.com/office/drawing/2010/main" val="0"/>
+              </a:ext>
+              <a:ext uri="{96DAC541-7B7A-43D3-8B79-37D633B846F1}">
+                <asvg:svgBlip xmlns:asvg="http://schemas.microsoft.com/office/drawing/2016/SVG/main" r:embed="rId15"/>
+              </a:ext>
+            </a:extLst>
+          </a:blip>
+          <a:stretch>
+            <a:fillRect/>
+          </a:stretch>
+        </p:blipFill>
+        <p:spPr>
+          <a:xfrm>
+            <a:off x="3707937" y="5130920"/>
+            <a:ext cx="828760" cy="828760"/>
+          </a:xfrm>
+          <a:prstGeom prst="rect">
+            <a:avLst/>
+          </a:prstGeom>
+        </p:spPr>
+      </p:pic>
+      <p:sp>
+        <p:nvSpPr>
+          <p:cNvPr id="24" name="CaixaDeTexto 23">
+            <a:extLst>
+              <a:ext uri="{FF2B5EF4-FFF2-40B4-BE49-F238E27FC236}">
+                <a16:creationId xmlns:a16="http://schemas.microsoft.com/office/drawing/2014/main" id="{CBDD161F-1996-383C-A80F-BD93E7652464}"/>
+              </a:ext>
+            </a:extLst>
+          </p:cNvPr>
+          <p:cNvSpPr txBox="1"/>
+          <p:nvPr/>
+        </p:nvSpPr>
+        <p:spPr>
+          <a:xfrm>
+            <a:off x="2734056" y="5887262"/>
+            <a:ext cx="2320362" cy="646331"/>
+          </a:xfrm>
+          <a:prstGeom prst="rect">
+            <a:avLst/>
+          </a:prstGeom>
+          <a:noFill/>
+        </p:spPr>
+        <p:txBody>
+          <a:bodyPr wrap="square" rtlCol="0">
+            <a:spAutoFit/>
+          </a:bodyPr>
+          <a:lstStyle/>
+          <a:p>
+            <a:pPr algn="ctr"/>
+            <a:r>
+              <a:rPr lang="pt-BR" b="1" dirty="0">
+                <a:latin typeface="Arial" panose="020B0604020202020204" pitchFamily="34" charset="0"/>
+                <a:cs typeface="Arial" panose="020B0604020202020204" pitchFamily="34" charset="0"/>
+              </a:rPr>
+              <a:t>Acesso ao sistema de monitoramento</a:t>
+            </a:r>
+          </a:p>
+        </p:txBody>
+      </p:sp>
+      <p:sp>
+        <p:nvSpPr>
+          <p:cNvPr id="46" name="Elipse 45">
+            <a:extLst>
+              <a:ext uri="{FF2B5EF4-FFF2-40B4-BE49-F238E27FC236}">
+                <a16:creationId xmlns:a16="http://schemas.microsoft.com/office/drawing/2014/main" id="{4D1A500C-0180-0057-4613-23C7349ECF9A}"/>
+              </a:ext>
+            </a:extLst>
+          </p:cNvPr>
+          <p:cNvSpPr/>
+          <p:nvPr/>
+        </p:nvSpPr>
+        <p:spPr>
+          <a:xfrm>
+            <a:off x="6597755" y="3801601"/>
+            <a:ext cx="2480160" cy="2453216"/>
+          </a:xfrm>
+          <a:prstGeom prst="ellipse">
+            <a:avLst/>
+          </a:prstGeom>
+          <a:solidFill>
+            <a:schemeClr val="bg1"/>
+          </a:solidFill>
+          <a:ln>
+            <a:noFill/>
+          </a:ln>
+        </p:spPr>
+        <p:style>
+          <a:lnRef idx="2">
+            <a:schemeClr val="accent1">
+              <a:shade val="50000"/>
+            </a:schemeClr>
+          </a:lnRef>
+          <a:fillRef idx="1">
+            <a:schemeClr val="accent1"/>
+          </a:fillRef>
+          <a:effectRef idx="0">
+            <a:schemeClr val="accent1"/>
+          </a:effectRef>
+          <a:fontRef idx="minor">
+            <a:schemeClr val="lt1"/>
+          </a:fontRef>
+        </p:style>
+        <p:txBody>
+          <a:bodyPr rtlCol="0" anchor="ctr"/>
+          <a:lstStyle/>
+          <a:p>
+            <a:pPr algn="ctr"/>
+            <a:endParaRPr lang="pt-BR"/>
+          </a:p>
+        </p:txBody>
+      </p:sp>
+      <p:grpSp>
+        <p:nvGrpSpPr>
+          <p:cNvPr id="8" name="Agrupar 7">
+            <a:extLst>
+              <a:ext uri="{FF2B5EF4-FFF2-40B4-BE49-F238E27FC236}">
+                <a16:creationId xmlns:a16="http://schemas.microsoft.com/office/drawing/2014/main" id="{F9AA3573-E593-BC2F-F270-EF444582CADC}"/>
+              </a:ext>
+            </a:extLst>
+          </p:cNvPr>
+          <p:cNvGrpSpPr/>
+          <p:nvPr/>
+        </p:nvGrpSpPr>
+        <p:grpSpPr>
+          <a:xfrm>
+            <a:off x="4165085" y="1367471"/>
+            <a:ext cx="2253784" cy="2165266"/>
+            <a:chOff x="3925069" y="1418121"/>
+            <a:chExt cx="2253784" cy="2165266"/>
+          </a:xfrm>
+        </p:grpSpPr>
+        <p:grpSp>
+          <p:nvGrpSpPr>
+            <p:cNvPr id="18" name="Agrupar 17">
               <a:extLst>
                 <a:ext uri="{FF2B5EF4-FFF2-40B4-BE49-F238E27FC236}">
-                  <a16:creationId xmlns:a16="http://schemas.microsoft.com/office/drawing/2014/main" id="{7B9CB8AD-9DCD-6140-780F-FD0BCB0B8527}"/>
+                  <a16:creationId xmlns:a16="http://schemas.microsoft.com/office/drawing/2014/main" id="{B5137A70-B7F1-72F2-0FDE-902CBCD9462E}"/>
                 </a:ext>
               </a:extLst>
             </p:cNvPr>
-            <p:cNvPicPr>
-              <a:picLocks noChangeAspect="1" noChangeArrowheads="1"/>
-            </p:cNvPicPr>
+            <p:cNvGrpSpPr/>
             <p:nvPr/>
-          </p:nvPicPr>
-          <p:blipFill>
-            <a:blip r:embed="rId24">
+          </p:nvGrpSpPr>
+          <p:grpSpPr>
+            <a:xfrm>
+              <a:off x="3925069" y="1418121"/>
+              <a:ext cx="2111744" cy="1666537"/>
+              <a:chOff x="4203210" y="2108639"/>
+              <a:chExt cx="1940675" cy="1560990"/>
+            </a:xfrm>
+          </p:grpSpPr>
+          <p:pic>
+            <p:nvPicPr>
+              <p:cNvPr id="21" name="Gráfico 20" descr="Apresentação com gráfico de barras">
+                <a:extLst>
+                  <a:ext uri="{FF2B5EF4-FFF2-40B4-BE49-F238E27FC236}">
+                    <a16:creationId xmlns:a16="http://schemas.microsoft.com/office/drawing/2014/main" id="{EDDCE4C1-CD8A-345C-91CA-9E312CED6093}"/>
+                  </a:ext>
+                </a:extLst>
+              </p:cNvPr>
+              <p:cNvPicPr>
+                <a:picLocks noChangeAspect="1"/>
+              </p:cNvPicPr>
+              <p:nvPr/>
+            </p:nvPicPr>
+            <p:blipFill>
+              <a:blip r:embed="rId16">
+                <a:extLst>
+                  <a:ext uri="{28A0092B-C50C-407E-A947-70E740481C1C}">
+                    <a14:useLocalDpi xmlns:a14="http://schemas.microsoft.com/office/drawing/2010/main" val="0"/>
+                  </a:ext>
+                  <a:ext uri="{96DAC541-7B7A-43D3-8B79-37D633B846F1}">
+                    <asvg:svgBlip xmlns:asvg="http://schemas.microsoft.com/office/drawing/2016/SVG/main" r:embed="rId17"/>
+                  </a:ext>
+                </a:extLst>
+              </a:blip>
+              <a:stretch>
+                <a:fillRect/>
+              </a:stretch>
+            </p:blipFill>
+            <p:spPr>
+              <a:xfrm>
+                <a:off x="4582895" y="2108639"/>
+                <a:ext cx="1560990" cy="1560990"/>
+              </a:xfrm>
+              <a:prstGeom prst="rect">
+                <a:avLst/>
+              </a:prstGeom>
+            </p:spPr>
+          </p:pic>
+          <p:pic>
+            <p:nvPicPr>
+              <p:cNvPr id="22" name="Gráfico 21" descr="Gráfico de pizza">
+                <a:extLst>
+                  <a:ext uri="{FF2B5EF4-FFF2-40B4-BE49-F238E27FC236}">
+                    <a16:creationId xmlns:a16="http://schemas.microsoft.com/office/drawing/2014/main" id="{4E57DAB1-0CDB-B1C1-1EF3-8C2B8EC47B8B}"/>
+                  </a:ext>
+                </a:extLst>
+              </p:cNvPr>
+              <p:cNvPicPr>
+                <a:picLocks noChangeAspect="1"/>
+              </p:cNvPicPr>
+              <p:nvPr/>
+            </p:nvPicPr>
+            <p:blipFill>
+              <a:blip r:embed="rId18">
+                <a:extLst>
+                  <a:ext uri="{28A0092B-C50C-407E-A947-70E740481C1C}">
+                    <a14:useLocalDpi xmlns:a14="http://schemas.microsoft.com/office/drawing/2010/main" val="0"/>
+                  </a:ext>
+                  <a:ext uri="{96DAC541-7B7A-43D3-8B79-37D633B846F1}">
+                    <asvg:svgBlip xmlns:asvg="http://schemas.microsoft.com/office/drawing/2016/SVG/main" r:embed="rId19"/>
+                  </a:ext>
+                </a:extLst>
+              </a:blip>
+              <a:stretch>
+                <a:fillRect/>
+              </a:stretch>
+            </p:blipFill>
+            <p:spPr>
+              <a:xfrm>
+                <a:off x="4203210" y="2108639"/>
+                <a:ext cx="914400" cy="914400"/>
+              </a:xfrm>
+              <a:prstGeom prst="rect">
+                <a:avLst/>
+              </a:prstGeom>
+            </p:spPr>
+          </p:pic>
+        </p:grpSp>
+        <p:sp>
+          <p:nvSpPr>
+            <p:cNvPr id="19" name="CaixaDeTexto 18">
               <a:extLst>
-                <a:ext uri="{28A0092B-C50C-407E-A947-70E740481C1C}">
-                  <a14:useLocalDpi xmlns:a14="http://schemas.microsoft.com/office/drawing/2010/main" val="0"/>
+                <a:ext uri="{FF2B5EF4-FFF2-40B4-BE49-F238E27FC236}">
+                  <a16:creationId xmlns:a16="http://schemas.microsoft.com/office/drawing/2014/main" id="{EECB7940-6264-05CD-DF78-C41251CAF551}"/>
                 </a:ext>
               </a:extLst>
-            </a:blip>
-            <a:srcRect/>
-            <a:stretch>
-              <a:fillRect/>
-            </a:stretch>
-          </p:blipFill>
-          <p:spPr bwMode="auto">
-            <a:xfrm rot="1635736">
-              <a:off x="470163" y="3995132"/>
-              <a:ext cx="3092531" cy="1623579"/>
+            </p:cNvPr>
+            <p:cNvSpPr txBox="1"/>
+            <p:nvPr/>
+          </p:nvSpPr>
+          <p:spPr>
+            <a:xfrm>
+              <a:off x="4098356" y="2937056"/>
+              <a:ext cx="2080497" cy="646331"/>
             </a:xfrm>
             <a:prstGeom prst="rect">
               <a:avLst/>
             </a:prstGeom>
             <a:noFill/>
-            <a:extLst>
-              <a:ext uri="{909E8E84-426E-40DD-AFC4-6F175D3DCCD1}">
-                <a14:hiddenFill xmlns:a14="http://schemas.microsoft.com/office/drawing/2010/main">
-                  <a:solidFill>
-                    <a:srgbClr val="FFFFFF"/>
-                  </a:solidFill>
-                </a14:hiddenFill>
-              </a:ext>
-            </a:extLst>
           </p:spPr>
-        </p:pic>
+          <p:txBody>
+            <a:bodyPr wrap="square" rtlCol="0">
+              <a:spAutoFit/>
+            </a:bodyPr>
+            <a:lstStyle/>
+            <a:p>
+              <a:pPr algn="ctr"/>
+              <a:r>
+                <a:rPr lang="pt-BR" b="1" dirty="0">
+                  <a:latin typeface="Arial" panose="020B0604020202020204" pitchFamily="34" charset="0"/>
+                  <a:cs typeface="Arial" panose="020B0604020202020204" pitchFamily="34" charset="0"/>
+                </a:rPr>
+                <a:t>Dashboard em tempo real</a:t>
+              </a:r>
+            </a:p>
+          </p:txBody>
+        </p:sp>
         <p:pic>
           <p:nvPicPr>
-            <p:cNvPr id="11" name="Picture 2" descr="Pin em Coisas para comprar">
+            <p:cNvPr id="20" name="Gráfico 19" descr="Lupa">
               <a:extLst>
                 <a:ext uri="{FF2B5EF4-FFF2-40B4-BE49-F238E27FC236}">
-                  <a16:creationId xmlns:a16="http://schemas.microsoft.com/office/drawing/2014/main" id="{974318EF-536A-5579-0B15-BAFB6DBFCF0D}"/>
+                  <a16:creationId xmlns:a16="http://schemas.microsoft.com/office/drawing/2014/main" id="{B710DEEE-372B-0FEE-CF77-13C47B4B60B3}"/>
                 </a:ext>
               </a:extLst>
             </p:cNvPr>
             <p:cNvPicPr>
-              <a:picLocks noChangeAspect="1" noChangeArrowheads="1"/>
+              <a:picLocks noChangeAspect="1"/>
             </p:cNvPicPr>
             <p:nvPr/>
           </p:nvPicPr>
           <p:blipFill>
-            <a:blip r:embed="rId24">
+            <a:blip r:embed="rId20">
               <a:extLst>
                 <a:ext uri="{28A0092B-C50C-407E-A947-70E740481C1C}">
                   <a14:useLocalDpi xmlns:a14="http://schemas.microsoft.com/office/drawing/2010/main" val="0"/>
                 </a:ext>
+                <a:ext uri="{96DAC541-7B7A-43D3-8B79-37D633B846F1}">
+                  <asvg:svgBlip xmlns:asvg="http://schemas.microsoft.com/office/drawing/2016/SVG/main" r:embed="rId21"/>
+                </a:ext>
               </a:extLst>
             </a:blip>
-            <a:srcRect/>
             <a:stretch>
               <a:fillRect/>
             </a:stretch>
           </p:blipFill>
-          <p:spPr bwMode="auto">
-            <a:xfrm rot="15626870">
-              <a:off x="3956533" y="3364528"/>
-              <a:ext cx="3092531" cy="1623579"/>
+          <p:spPr>
+            <a:xfrm>
+              <a:off x="5490155" y="1881605"/>
+              <a:ext cx="655565" cy="655565"/>
+            </a:xfrm>
+            <a:prstGeom prst="rect">
+              <a:avLst/>
+            </a:prstGeom>
+          </p:spPr>
+        </p:pic>
+      </p:grpSp>
+      <p:grpSp>
+        <p:nvGrpSpPr>
+          <p:cNvPr id="9" name="Agrupar 8">
+            <a:extLst>
+              <a:ext uri="{FF2B5EF4-FFF2-40B4-BE49-F238E27FC236}">
+                <a16:creationId xmlns:a16="http://schemas.microsoft.com/office/drawing/2014/main" id="{8ACEBB6C-FE8D-3D19-4653-522FE6B22791}"/>
+              </a:ext>
+            </a:extLst>
+          </p:cNvPr>
+          <p:cNvGrpSpPr/>
+          <p:nvPr/>
+        </p:nvGrpSpPr>
+        <p:grpSpPr>
+          <a:xfrm>
+            <a:off x="6652089" y="3612399"/>
+            <a:ext cx="2409179" cy="2487134"/>
+            <a:chOff x="6456469" y="4035915"/>
+            <a:chExt cx="2409179" cy="2487134"/>
+          </a:xfrm>
+        </p:grpSpPr>
+        <p:grpSp>
+          <p:nvGrpSpPr>
+            <p:cNvPr id="14" name="Agrupar 13">
+              <a:extLst>
+                <a:ext uri="{FF2B5EF4-FFF2-40B4-BE49-F238E27FC236}">
+                  <a16:creationId xmlns:a16="http://schemas.microsoft.com/office/drawing/2014/main" id="{88D72902-EDC8-EF46-0FBE-1C770A952396}"/>
+                </a:ext>
+              </a:extLst>
+            </p:cNvPr>
+            <p:cNvGrpSpPr/>
+            <p:nvPr/>
+          </p:nvGrpSpPr>
+          <p:grpSpPr>
+            <a:xfrm>
+              <a:off x="6748381" y="4035915"/>
+              <a:ext cx="1801829" cy="1801829"/>
+              <a:chOff x="6814659" y="3766213"/>
+              <a:chExt cx="1801829" cy="1801829"/>
+            </a:xfrm>
+          </p:grpSpPr>
+          <p:pic>
+            <p:nvPicPr>
+              <p:cNvPr id="16" name="Gráfico 15" descr="Computador">
+                <a:extLst>
+                  <a:ext uri="{FF2B5EF4-FFF2-40B4-BE49-F238E27FC236}">
+                    <a16:creationId xmlns:a16="http://schemas.microsoft.com/office/drawing/2014/main" id="{B523CF9B-6FB9-160D-738A-CC5C64839504}"/>
+                  </a:ext>
+                </a:extLst>
+              </p:cNvPr>
+              <p:cNvPicPr>
+                <a:picLocks noChangeAspect="1"/>
+              </p:cNvPicPr>
+              <p:nvPr/>
+            </p:nvPicPr>
+            <p:blipFill>
+              <a:blip r:embed="rId2">
+                <a:extLst>
+                  <a:ext uri="{28A0092B-C50C-407E-A947-70E740481C1C}">
+                    <a14:useLocalDpi xmlns:a14="http://schemas.microsoft.com/office/drawing/2010/main" val="0"/>
+                  </a:ext>
+                  <a:ext uri="{96DAC541-7B7A-43D3-8B79-37D633B846F1}">
+                    <asvg:svgBlip xmlns:asvg="http://schemas.microsoft.com/office/drawing/2016/SVG/main" r:embed="rId3"/>
+                  </a:ext>
+                </a:extLst>
+              </a:blip>
+              <a:stretch>
+                <a:fillRect/>
+              </a:stretch>
+            </p:blipFill>
+            <p:spPr>
+              <a:xfrm>
+                <a:off x="6814659" y="3766213"/>
+                <a:ext cx="1801829" cy="1801829"/>
+              </a:xfrm>
+              <a:prstGeom prst="rect">
+                <a:avLst/>
+              </a:prstGeom>
+            </p:spPr>
+          </p:pic>
+          <p:pic>
+            <p:nvPicPr>
+              <p:cNvPr id="17" name="Gráfico 16" descr="Sirene">
+                <a:extLst>
+                  <a:ext uri="{FF2B5EF4-FFF2-40B4-BE49-F238E27FC236}">
+                    <a16:creationId xmlns:a16="http://schemas.microsoft.com/office/drawing/2014/main" id="{B9EADA90-D48C-476F-29BB-5602BDCDB155}"/>
+                  </a:ext>
+                </a:extLst>
+              </p:cNvPr>
+              <p:cNvPicPr>
+                <a:picLocks noChangeAspect="1"/>
+              </p:cNvPicPr>
+              <p:nvPr/>
+            </p:nvPicPr>
+            <p:blipFill>
+              <a:blip r:embed="rId22">
+                <a:extLst>
+                  <a:ext uri="{28A0092B-C50C-407E-A947-70E740481C1C}">
+                    <a14:useLocalDpi xmlns:a14="http://schemas.microsoft.com/office/drawing/2010/main" val="0"/>
+                  </a:ext>
+                  <a:ext uri="{96DAC541-7B7A-43D3-8B79-37D633B846F1}">
+                    <asvg:svgBlip xmlns:asvg="http://schemas.microsoft.com/office/drawing/2016/SVG/main" r:embed="rId23"/>
+                  </a:ext>
+                </a:extLst>
+              </a:blip>
+              <a:stretch>
+                <a:fillRect/>
+              </a:stretch>
+            </p:blipFill>
+            <p:spPr>
+              <a:xfrm>
+                <a:off x="7031110" y="4156512"/>
+                <a:ext cx="761717" cy="761717"/>
+              </a:xfrm>
+              <a:prstGeom prst="rect">
+                <a:avLst/>
+              </a:prstGeom>
+            </p:spPr>
+          </p:pic>
+        </p:grpSp>
+        <p:sp>
+          <p:nvSpPr>
+            <p:cNvPr id="15" name="CaixaDeTexto 14">
+              <a:extLst>
+                <a:ext uri="{FF2B5EF4-FFF2-40B4-BE49-F238E27FC236}">
+                  <a16:creationId xmlns:a16="http://schemas.microsoft.com/office/drawing/2014/main" id="{B14F7EF8-5D5E-E4D1-CFCA-9AF46AC55432}"/>
+                </a:ext>
+              </a:extLst>
+            </p:cNvPr>
+            <p:cNvSpPr txBox="1"/>
+            <p:nvPr/>
+          </p:nvSpPr>
+          <p:spPr>
+            <a:xfrm>
+              <a:off x="6456469" y="5599719"/>
+              <a:ext cx="2409179" cy="923330"/>
             </a:xfrm>
             <a:prstGeom prst="rect">
               <a:avLst/>
             </a:prstGeom>
             <a:noFill/>
-            <a:extLst>
-              <a:ext uri="{909E8E84-426E-40DD-AFC4-6F175D3DCCD1}">
-                <a14:hiddenFill xmlns:a14="http://schemas.microsoft.com/office/drawing/2010/main">
-                  <a:solidFill>
-                    <a:srgbClr val="FFFFFF"/>
-                  </a:solidFill>
-                </a14:hiddenFill>
-              </a:ext>
-            </a:extLst>
           </p:spPr>
-        </p:pic>
-        <p:pic>
-          <p:nvPicPr>
-            <p:cNvPr id="12" name="Picture 2" descr="Pin em Coisas para comprar">
-              <a:extLst>
-                <a:ext uri="{FF2B5EF4-FFF2-40B4-BE49-F238E27FC236}">
-                  <a16:creationId xmlns:a16="http://schemas.microsoft.com/office/drawing/2014/main" id="{80D90617-D53C-0636-6270-AEE4C9DF59B6}"/>
-                </a:ext>
-              </a:extLst>
-            </p:cNvPr>
-            <p:cNvPicPr>
-              <a:picLocks noChangeAspect="1" noChangeArrowheads="1"/>
-            </p:cNvPicPr>
-            <p:nvPr/>
-          </p:nvPicPr>
-          <p:blipFill>
-            <a:blip r:embed="rId24">
-              <a:extLst>
-                <a:ext uri="{28A0092B-C50C-407E-A947-70E740481C1C}">
-                  <a14:useLocalDpi xmlns:a14="http://schemas.microsoft.com/office/drawing/2010/main" val="0"/>
-                </a:ext>
-              </a:extLst>
-            </a:blip>
-            <a:srcRect/>
-            <a:stretch>
-              <a:fillRect/>
-            </a:stretch>
-          </p:blipFill>
-          <p:spPr bwMode="auto">
-            <a:xfrm rot="4938566" flipV="1">
-              <a:off x="5714864" y="1770512"/>
-              <a:ext cx="3092531" cy="1623579"/>
-            </a:xfrm>
-            <a:prstGeom prst="rect">
-              <a:avLst/>
-            </a:prstGeom>
-            <a:noFill/>
-            <a:extLst>
-              <a:ext uri="{909E8E84-426E-40DD-AFC4-6F175D3DCCD1}">
-                <a14:hiddenFill xmlns:a14="http://schemas.microsoft.com/office/drawing/2010/main">
-                  <a:solidFill>
-                    <a:srgbClr val="FFFFFF"/>
-                  </a:solidFill>
-                </a14:hiddenFill>
-              </a:ext>
-            </a:extLst>
-          </p:spPr>
-        </p:pic>
-        <p:pic>
-          <p:nvPicPr>
-            <p:cNvPr id="13" name="Picture 2" descr="Pin em Coisas para comprar">
-              <a:extLst>
-                <a:ext uri="{FF2B5EF4-FFF2-40B4-BE49-F238E27FC236}">
-                  <a16:creationId xmlns:a16="http://schemas.microsoft.com/office/drawing/2014/main" id="{C9294253-0E7F-16DE-7241-C75559E8A9DB}"/>
-                </a:ext>
-              </a:extLst>
-            </p:cNvPr>
-            <p:cNvPicPr>
-              <a:picLocks noChangeAspect="1" noChangeArrowheads="1"/>
-            </p:cNvPicPr>
-            <p:nvPr/>
-          </p:nvPicPr>
-          <p:blipFill>
-            <a:blip r:embed="rId24">
-              <a:extLst>
-                <a:ext uri="{28A0092B-C50C-407E-A947-70E740481C1C}">
-                  <a14:useLocalDpi xmlns:a14="http://schemas.microsoft.com/office/drawing/2010/main" val="0"/>
-                </a:ext>
-              </a:extLst>
-            </a:blip>
-            <a:srcRect/>
-            <a:stretch>
-              <a:fillRect/>
-            </a:stretch>
-          </p:blipFill>
-          <p:spPr bwMode="auto">
-            <a:xfrm rot="16563888">
-              <a:off x="8344155" y="3467802"/>
-              <a:ext cx="3092531" cy="1623579"/>
-            </a:xfrm>
-            <a:prstGeom prst="rect">
-              <a:avLst/>
-            </a:prstGeom>
-            <a:noFill/>
-            <a:extLst>
-              <a:ext uri="{909E8E84-426E-40DD-AFC4-6F175D3DCCD1}">
-                <a14:hiddenFill xmlns:a14="http://schemas.microsoft.com/office/drawing/2010/main">
-                  <a:solidFill>
-                    <a:srgbClr val="FFFFFF"/>
-                  </a:solidFill>
-                </a14:hiddenFill>
-              </a:ext>
-            </a:extLst>
-          </p:spPr>
-        </p:pic>
+          <p:txBody>
+            <a:bodyPr wrap="square" rtlCol="0">
+              <a:spAutoFit/>
+            </a:bodyPr>
+            <a:lstStyle/>
+            <a:p>
+              <a:pPr algn="ctr"/>
+              <a:r>
+                <a:rPr lang="pt-BR" b="1" dirty="0">
+                  <a:latin typeface="Arial" panose="020B0604020202020204" pitchFamily="34" charset="0"/>
+                  <a:cs typeface="Arial" panose="020B0604020202020204" pitchFamily="34" charset="0"/>
+                </a:rPr>
+                <a:t>Alertas com base no monitoramento das dashboard</a:t>
+              </a:r>
+            </a:p>
+          </p:txBody>
+        </p:sp>
       </p:grpSp>
+      <p:pic>
+        <p:nvPicPr>
+          <p:cNvPr id="10" name="Picture 2" descr="Pin em Coisas para comprar">
+            <a:extLst>
+              <a:ext uri="{FF2B5EF4-FFF2-40B4-BE49-F238E27FC236}">
+                <a16:creationId xmlns:a16="http://schemas.microsoft.com/office/drawing/2014/main" id="{7B9CB8AD-9DCD-6140-780F-FD0BCB0B8527}"/>
+              </a:ext>
+            </a:extLst>
+          </p:cNvPr>
+          <p:cNvPicPr>
+            <a:picLocks noChangeAspect="1" noChangeArrowheads="1"/>
+          </p:cNvPicPr>
+          <p:nvPr/>
+        </p:nvPicPr>
+        <p:blipFill>
+          <a:blip r:embed="rId24">
+            <a:extLst>
+              <a:ext uri="{28A0092B-C50C-407E-A947-70E740481C1C}">
+                <a14:useLocalDpi xmlns:a14="http://schemas.microsoft.com/office/drawing/2010/main" val="0"/>
+              </a:ext>
+            </a:extLst>
+          </a:blip>
+          <a:srcRect/>
+          <a:stretch>
+            <a:fillRect/>
+          </a:stretch>
+        </p:blipFill>
+        <p:spPr bwMode="auto">
+          <a:xfrm rot="1635736">
+            <a:off x="594764" y="4264078"/>
+            <a:ext cx="3092531" cy="1623579"/>
+          </a:xfrm>
+          <a:prstGeom prst="rect">
+            <a:avLst/>
+          </a:prstGeom>
+          <a:noFill/>
+          <a:extLst>
+            <a:ext uri="{909E8E84-426E-40DD-AFC4-6F175D3DCCD1}">
+              <a14:hiddenFill xmlns:a14="http://schemas.microsoft.com/office/drawing/2010/main">
+                <a:solidFill>
+                  <a:srgbClr val="FFFFFF"/>
+                </a:solidFill>
+              </a14:hiddenFill>
+            </a:ext>
+          </a:extLst>
+        </p:spPr>
+      </p:pic>
+      <p:pic>
+        <p:nvPicPr>
+          <p:cNvPr id="11" name="Picture 2" descr="Pin em Coisas para comprar">
+            <a:extLst>
+              <a:ext uri="{FF2B5EF4-FFF2-40B4-BE49-F238E27FC236}">
+                <a16:creationId xmlns:a16="http://schemas.microsoft.com/office/drawing/2014/main" id="{974318EF-536A-5579-0B15-BAFB6DBFCF0D}"/>
+              </a:ext>
+            </a:extLst>
+          </p:cNvPr>
+          <p:cNvPicPr>
+            <a:picLocks noChangeAspect="1" noChangeArrowheads="1"/>
+          </p:cNvPicPr>
+          <p:nvPr/>
+        </p:nvPicPr>
+        <p:blipFill>
+          <a:blip r:embed="rId24">
+            <a:extLst>
+              <a:ext uri="{28A0092B-C50C-407E-A947-70E740481C1C}">
+                <a14:useLocalDpi xmlns:a14="http://schemas.microsoft.com/office/drawing/2010/main" val="0"/>
+              </a:ext>
+            </a:extLst>
+          </a:blip>
+          <a:srcRect/>
+          <a:stretch>
+            <a:fillRect/>
+          </a:stretch>
+        </p:blipFill>
+        <p:spPr bwMode="auto">
+          <a:xfrm rot="15626870">
+            <a:off x="4081134" y="3633474"/>
+            <a:ext cx="3092531" cy="1623579"/>
+          </a:xfrm>
+          <a:prstGeom prst="rect">
+            <a:avLst/>
+          </a:prstGeom>
+          <a:noFill/>
+          <a:extLst>
+            <a:ext uri="{909E8E84-426E-40DD-AFC4-6F175D3DCCD1}">
+              <a14:hiddenFill xmlns:a14="http://schemas.microsoft.com/office/drawing/2010/main">
+                <a:solidFill>
+                  <a:srgbClr val="FFFFFF"/>
+                </a:solidFill>
+              </a14:hiddenFill>
+            </a:ext>
+          </a:extLst>
+        </p:spPr>
+      </p:pic>
+      <p:pic>
+        <p:nvPicPr>
+          <p:cNvPr id="12" name="Picture 2" descr="Pin em Coisas para comprar">
+            <a:extLst>
+              <a:ext uri="{FF2B5EF4-FFF2-40B4-BE49-F238E27FC236}">
+                <a16:creationId xmlns:a16="http://schemas.microsoft.com/office/drawing/2014/main" id="{80D90617-D53C-0636-6270-AEE4C9DF59B6}"/>
+              </a:ext>
+            </a:extLst>
+          </p:cNvPr>
+          <p:cNvPicPr>
+            <a:picLocks noChangeAspect="1" noChangeArrowheads="1"/>
+          </p:cNvPicPr>
+          <p:nvPr/>
+        </p:nvPicPr>
+        <p:blipFill>
+          <a:blip r:embed="rId24">
+            <a:extLst>
+              <a:ext uri="{28A0092B-C50C-407E-A947-70E740481C1C}">
+                <a14:useLocalDpi xmlns:a14="http://schemas.microsoft.com/office/drawing/2010/main" val="0"/>
+              </a:ext>
+            </a:extLst>
+          </a:blip>
+          <a:srcRect/>
+          <a:stretch>
+            <a:fillRect/>
+          </a:stretch>
+        </p:blipFill>
+        <p:spPr bwMode="auto">
+          <a:xfrm rot="4938566" flipV="1">
+            <a:off x="5839465" y="2039458"/>
+            <a:ext cx="3092531" cy="1623579"/>
+          </a:xfrm>
+          <a:prstGeom prst="rect">
+            <a:avLst/>
+          </a:prstGeom>
+          <a:noFill/>
+          <a:extLst>
+            <a:ext uri="{909E8E84-426E-40DD-AFC4-6F175D3DCCD1}">
+              <a14:hiddenFill xmlns:a14="http://schemas.microsoft.com/office/drawing/2010/main">
+                <a:solidFill>
+                  <a:srgbClr val="FFFFFF"/>
+                </a:solidFill>
+              </a14:hiddenFill>
+            </a:ext>
+          </a:extLst>
+        </p:spPr>
+      </p:pic>
+      <p:pic>
+        <p:nvPicPr>
+          <p:cNvPr id="13" name="Picture 2" descr="Pin em Coisas para comprar">
+            <a:extLst>
+              <a:ext uri="{FF2B5EF4-FFF2-40B4-BE49-F238E27FC236}">
+                <a16:creationId xmlns:a16="http://schemas.microsoft.com/office/drawing/2014/main" id="{C9294253-0E7F-16DE-7241-C75559E8A9DB}"/>
+              </a:ext>
+            </a:extLst>
+          </p:cNvPr>
+          <p:cNvPicPr>
+            <a:picLocks noChangeAspect="1" noChangeArrowheads="1"/>
+          </p:cNvPicPr>
+          <p:nvPr/>
+        </p:nvPicPr>
+        <p:blipFill>
+          <a:blip r:embed="rId24">
+            <a:extLst>
+              <a:ext uri="{28A0092B-C50C-407E-A947-70E740481C1C}">
+                <a14:useLocalDpi xmlns:a14="http://schemas.microsoft.com/office/drawing/2010/main" val="0"/>
+              </a:ext>
+            </a:extLst>
+          </a:blip>
+          <a:srcRect/>
+          <a:stretch>
+            <a:fillRect/>
+          </a:stretch>
+        </p:blipFill>
+        <p:spPr bwMode="auto">
+          <a:xfrm rot="16563888">
+            <a:off x="8468756" y="3736748"/>
+            <a:ext cx="3092531" cy="1623579"/>
+          </a:xfrm>
+          <a:prstGeom prst="rect">
+            <a:avLst/>
+          </a:prstGeom>
+          <a:noFill/>
+          <a:extLst>
+            <a:ext uri="{909E8E84-426E-40DD-AFC4-6F175D3DCCD1}">
+              <a14:hiddenFill xmlns:a14="http://schemas.microsoft.com/office/drawing/2010/main">
+                <a:solidFill>
+                  <a:srgbClr val="FFFFFF"/>
+                </a:solidFill>
+              </a14:hiddenFill>
+            </a:ext>
+          </a:extLst>
+        </p:spPr>
+      </p:pic>
     </p:spTree>
     <p:extLst>
       <p:ext uri="{BB962C8B-B14F-4D97-AF65-F5344CB8AC3E}">

</xml_diff>